<commit_message>
change to class order, minor change to ppt, remove unnecessary syntax review items
</commit_message>
<xml_diff>
--- a/Lecture Materials/Basic Rules for Clean Data.pptx
+++ b/Lecture Materials/Basic Rules for Clean Data.pptx
@@ -2,19 +2,18 @@
 <file path=ppt/presentation.xml><?xml version="1.0" encoding="utf-8"?>
 <p:presentation xmlns:a="http://schemas.openxmlformats.org/drawingml/2006/main" xmlns:r="http://schemas.openxmlformats.org/officeDocument/2006/relationships" xmlns:p="http://schemas.openxmlformats.org/presentationml/2006/main" saveSubsetFonts="1">
   <p:sldMasterIdLst>
-    <p:sldMasterId id="2147483648" r:id="rId1"/>
+    <p:sldMasterId id="2147483648" r:id="rId4"/>
   </p:sldMasterIdLst>
   <p:sldIdLst>
-    <p:sldId id="262" r:id="rId2"/>
-    <p:sldId id="257" r:id="rId3"/>
-    <p:sldId id="258" r:id="rId4"/>
-    <p:sldId id="259" r:id="rId5"/>
-    <p:sldId id="260" r:id="rId6"/>
-    <p:sldId id="261" r:id="rId7"/>
-    <p:sldId id="263" r:id="rId8"/>
-    <p:sldId id="265" r:id="rId9"/>
-    <p:sldId id="267" r:id="rId10"/>
-    <p:sldId id="266" r:id="rId11"/>
+    <p:sldId id="262" r:id="rId5"/>
+    <p:sldId id="257" r:id="rId6"/>
+    <p:sldId id="259" r:id="rId7"/>
+    <p:sldId id="260" r:id="rId8"/>
+    <p:sldId id="261" r:id="rId9"/>
+    <p:sldId id="263" r:id="rId10"/>
+    <p:sldId id="265" r:id="rId11"/>
+    <p:sldId id="267" r:id="rId12"/>
+    <p:sldId id="266" r:id="rId13"/>
   </p:sldIdLst>
   <p:sldSz cx="12192000" cy="6858000"/>
   <p:notesSz cx="6858000" cy="9144000"/>
@@ -163,10 +162,9 @@
           </a:lstStyle>
           <a:p>
             <a:r>
-              <a:rPr lang="en-US" smtClean="0"/>
+              <a:rPr lang="en-US"/>
               <a:t>Click to edit Master title style</a:t>
             </a:r>
-            <a:endParaRPr lang="en-US"/>
           </a:p>
         </p:txBody>
       </p:sp>
@@ -228,10 +226,9 @@
           </a:lstStyle>
           <a:p>
             <a:r>
-              <a:rPr lang="en-US" smtClean="0"/>
+              <a:rPr lang="en-US"/>
               <a:t>Click to edit Master subtitle style</a:t>
             </a:r>
-            <a:endParaRPr lang="en-US"/>
           </a:p>
         </p:txBody>
       </p:sp>
@@ -252,7 +249,7 @@
           <a:p>
             <a:fld id="{C2A2D427-75E2-4B45-A8AF-DF4EC7D5D4CC}" type="datetimeFigureOut">
               <a:rPr lang="en-US" smtClean="0"/>
-              <a:t>7/1/2019</a:t>
+              <a:t>9/15/20</a:t>
             </a:fld>
             <a:endParaRPr lang="en-US"/>
           </a:p>
@@ -346,10 +343,9 @@
           <a:lstStyle/>
           <a:p>
             <a:r>
-              <a:rPr lang="en-US" smtClean="0"/>
+              <a:rPr lang="en-US"/>
               <a:t>Click to edit Master title style</a:t>
             </a:r>
-            <a:endParaRPr lang="en-US"/>
           </a:p>
         </p:txBody>
       </p:sp>
@@ -370,38 +366,37 @@
           <a:p>
             <a:pPr lvl="0"/>
             <a:r>
-              <a:rPr lang="en-US" smtClean="0"/>
+              <a:rPr lang="en-US"/>
               <a:t>Click to edit Master text styles</a:t>
             </a:r>
           </a:p>
           <a:p>
             <a:pPr lvl="1"/>
             <a:r>
-              <a:rPr lang="en-US" smtClean="0"/>
+              <a:rPr lang="en-US"/>
               <a:t>Second level</a:t>
             </a:r>
           </a:p>
           <a:p>
             <a:pPr lvl="2"/>
             <a:r>
-              <a:rPr lang="en-US" smtClean="0"/>
+              <a:rPr lang="en-US"/>
               <a:t>Third level</a:t>
             </a:r>
           </a:p>
           <a:p>
             <a:pPr lvl="3"/>
             <a:r>
-              <a:rPr lang="en-US" smtClean="0"/>
+              <a:rPr lang="en-US"/>
               <a:t>Fourth level</a:t>
             </a:r>
           </a:p>
           <a:p>
             <a:pPr lvl="4"/>
             <a:r>
-              <a:rPr lang="en-US" smtClean="0"/>
+              <a:rPr lang="en-US"/>
               <a:t>Fifth level</a:t>
             </a:r>
-            <a:endParaRPr lang="en-US"/>
           </a:p>
         </p:txBody>
       </p:sp>
@@ -422,7 +417,7 @@
           <a:p>
             <a:fld id="{C2A2D427-75E2-4B45-A8AF-DF4EC7D5D4CC}" type="datetimeFigureOut">
               <a:rPr lang="en-US" smtClean="0"/>
-              <a:t>7/1/2019</a:t>
+              <a:t>9/15/20</a:t>
             </a:fld>
             <a:endParaRPr lang="en-US"/>
           </a:p>
@@ -521,10 +516,9 @@
           <a:lstStyle/>
           <a:p>
             <a:r>
-              <a:rPr lang="en-US" smtClean="0"/>
+              <a:rPr lang="en-US"/>
               <a:t>Click to edit Master title style</a:t>
             </a:r>
-            <a:endParaRPr lang="en-US"/>
           </a:p>
         </p:txBody>
       </p:sp>
@@ -550,38 +544,37 @@
           <a:p>
             <a:pPr lvl="0"/>
             <a:r>
-              <a:rPr lang="en-US" smtClean="0"/>
+              <a:rPr lang="en-US"/>
               <a:t>Click to edit Master text styles</a:t>
             </a:r>
           </a:p>
           <a:p>
             <a:pPr lvl="1"/>
             <a:r>
-              <a:rPr lang="en-US" smtClean="0"/>
+              <a:rPr lang="en-US"/>
               <a:t>Second level</a:t>
             </a:r>
           </a:p>
           <a:p>
             <a:pPr lvl="2"/>
             <a:r>
-              <a:rPr lang="en-US" smtClean="0"/>
+              <a:rPr lang="en-US"/>
               <a:t>Third level</a:t>
             </a:r>
           </a:p>
           <a:p>
             <a:pPr lvl="3"/>
             <a:r>
-              <a:rPr lang="en-US" smtClean="0"/>
+              <a:rPr lang="en-US"/>
               <a:t>Fourth level</a:t>
             </a:r>
           </a:p>
           <a:p>
             <a:pPr lvl="4"/>
             <a:r>
-              <a:rPr lang="en-US" smtClean="0"/>
+              <a:rPr lang="en-US"/>
               <a:t>Fifth level</a:t>
             </a:r>
-            <a:endParaRPr lang="en-US"/>
           </a:p>
         </p:txBody>
       </p:sp>
@@ -602,7 +595,7 @@
           <a:p>
             <a:fld id="{C2A2D427-75E2-4B45-A8AF-DF4EC7D5D4CC}" type="datetimeFigureOut">
               <a:rPr lang="en-US" smtClean="0"/>
-              <a:t>7/1/2019</a:t>
+              <a:t>9/15/20</a:t>
             </a:fld>
             <a:endParaRPr lang="en-US"/>
           </a:p>
@@ -696,10 +689,9 @@
           <a:lstStyle/>
           <a:p>
             <a:r>
-              <a:rPr lang="en-US" smtClean="0"/>
+              <a:rPr lang="en-US"/>
               <a:t>Click to edit Master title style</a:t>
             </a:r>
-            <a:endParaRPr lang="en-US"/>
           </a:p>
         </p:txBody>
       </p:sp>
@@ -720,38 +712,37 @@
           <a:p>
             <a:pPr lvl="0"/>
             <a:r>
-              <a:rPr lang="en-US" smtClean="0"/>
+              <a:rPr lang="en-US"/>
               <a:t>Click to edit Master text styles</a:t>
             </a:r>
           </a:p>
           <a:p>
             <a:pPr lvl="1"/>
             <a:r>
-              <a:rPr lang="en-US" smtClean="0"/>
+              <a:rPr lang="en-US"/>
               <a:t>Second level</a:t>
             </a:r>
           </a:p>
           <a:p>
             <a:pPr lvl="2"/>
             <a:r>
-              <a:rPr lang="en-US" smtClean="0"/>
+              <a:rPr lang="en-US"/>
               <a:t>Third level</a:t>
             </a:r>
           </a:p>
           <a:p>
             <a:pPr lvl="3"/>
             <a:r>
-              <a:rPr lang="en-US" smtClean="0"/>
+              <a:rPr lang="en-US"/>
               <a:t>Fourth level</a:t>
             </a:r>
           </a:p>
           <a:p>
             <a:pPr lvl="4"/>
             <a:r>
-              <a:rPr lang="en-US" smtClean="0"/>
+              <a:rPr lang="en-US"/>
               <a:t>Fifth level</a:t>
             </a:r>
-            <a:endParaRPr lang="en-US"/>
           </a:p>
         </p:txBody>
       </p:sp>
@@ -772,7 +763,7 @@
           <a:p>
             <a:fld id="{C2A2D427-75E2-4B45-A8AF-DF4EC7D5D4CC}" type="datetimeFigureOut">
               <a:rPr lang="en-US" smtClean="0"/>
-              <a:t>7/1/2019</a:t>
+              <a:t>9/15/20</a:t>
             </a:fld>
             <a:endParaRPr lang="en-US"/>
           </a:p>
@@ -875,10 +866,9 @@
           </a:lstStyle>
           <a:p>
             <a:r>
-              <a:rPr lang="en-US" smtClean="0"/>
+              <a:rPr lang="en-US"/>
               <a:t>Click to edit Master title style</a:t>
             </a:r>
-            <a:endParaRPr lang="en-US"/>
           </a:p>
         </p:txBody>
       </p:sp>
@@ -995,7 +985,7 @@
           <a:p>
             <a:pPr lvl="0"/>
             <a:r>
-              <a:rPr lang="en-US" smtClean="0"/>
+              <a:rPr lang="en-US"/>
               <a:t>Click to edit Master text styles</a:t>
             </a:r>
           </a:p>
@@ -1018,7 +1008,7 @@
           <a:p>
             <a:fld id="{C2A2D427-75E2-4B45-A8AF-DF4EC7D5D4CC}" type="datetimeFigureOut">
               <a:rPr lang="en-US" smtClean="0"/>
-              <a:t>7/1/2019</a:t>
+              <a:t>9/15/20</a:t>
             </a:fld>
             <a:endParaRPr lang="en-US"/>
           </a:p>
@@ -1112,10 +1102,9 @@
           <a:lstStyle/>
           <a:p>
             <a:r>
-              <a:rPr lang="en-US" smtClean="0"/>
+              <a:rPr lang="en-US"/>
               <a:t>Click to edit Master title style</a:t>
             </a:r>
-            <a:endParaRPr lang="en-US"/>
           </a:p>
         </p:txBody>
       </p:sp>
@@ -1141,38 +1130,37 @@
           <a:p>
             <a:pPr lvl="0"/>
             <a:r>
-              <a:rPr lang="en-US" smtClean="0"/>
+              <a:rPr lang="en-US"/>
               <a:t>Click to edit Master text styles</a:t>
             </a:r>
           </a:p>
           <a:p>
             <a:pPr lvl="1"/>
             <a:r>
-              <a:rPr lang="en-US" smtClean="0"/>
+              <a:rPr lang="en-US"/>
               <a:t>Second level</a:t>
             </a:r>
           </a:p>
           <a:p>
             <a:pPr lvl="2"/>
             <a:r>
-              <a:rPr lang="en-US" smtClean="0"/>
+              <a:rPr lang="en-US"/>
               <a:t>Third level</a:t>
             </a:r>
           </a:p>
           <a:p>
             <a:pPr lvl="3"/>
             <a:r>
-              <a:rPr lang="en-US" smtClean="0"/>
+              <a:rPr lang="en-US"/>
               <a:t>Fourth level</a:t>
             </a:r>
           </a:p>
           <a:p>
             <a:pPr lvl="4"/>
             <a:r>
-              <a:rPr lang="en-US" smtClean="0"/>
+              <a:rPr lang="en-US"/>
               <a:t>Fifth level</a:t>
             </a:r>
-            <a:endParaRPr lang="en-US"/>
           </a:p>
         </p:txBody>
       </p:sp>
@@ -1198,38 +1186,37 @@
           <a:p>
             <a:pPr lvl="0"/>
             <a:r>
-              <a:rPr lang="en-US" smtClean="0"/>
+              <a:rPr lang="en-US"/>
               <a:t>Click to edit Master text styles</a:t>
             </a:r>
           </a:p>
           <a:p>
             <a:pPr lvl="1"/>
             <a:r>
-              <a:rPr lang="en-US" smtClean="0"/>
+              <a:rPr lang="en-US"/>
               <a:t>Second level</a:t>
             </a:r>
           </a:p>
           <a:p>
             <a:pPr lvl="2"/>
             <a:r>
-              <a:rPr lang="en-US" smtClean="0"/>
+              <a:rPr lang="en-US"/>
               <a:t>Third level</a:t>
             </a:r>
           </a:p>
           <a:p>
             <a:pPr lvl="3"/>
             <a:r>
-              <a:rPr lang="en-US" smtClean="0"/>
+              <a:rPr lang="en-US"/>
               <a:t>Fourth level</a:t>
             </a:r>
           </a:p>
           <a:p>
             <a:pPr lvl="4"/>
             <a:r>
-              <a:rPr lang="en-US" smtClean="0"/>
+              <a:rPr lang="en-US"/>
               <a:t>Fifth level</a:t>
             </a:r>
-            <a:endParaRPr lang="en-US"/>
           </a:p>
         </p:txBody>
       </p:sp>
@@ -1250,7 +1237,7 @@
           <a:p>
             <a:fld id="{C2A2D427-75E2-4B45-A8AF-DF4EC7D5D4CC}" type="datetimeFigureOut">
               <a:rPr lang="en-US" smtClean="0"/>
-              <a:t>7/1/2019</a:t>
+              <a:t>9/15/20</a:t>
             </a:fld>
             <a:endParaRPr lang="en-US"/>
           </a:p>
@@ -1349,10 +1336,9 @@
           <a:lstStyle/>
           <a:p>
             <a:r>
-              <a:rPr lang="en-US" smtClean="0"/>
+              <a:rPr lang="en-US"/>
               <a:t>Click to edit Master title style</a:t>
             </a:r>
-            <a:endParaRPr lang="en-US"/>
           </a:p>
         </p:txBody>
       </p:sp>
@@ -1415,7 +1401,7 @@
           <a:p>
             <a:pPr lvl="0"/>
             <a:r>
-              <a:rPr lang="en-US" smtClean="0"/>
+              <a:rPr lang="en-US"/>
               <a:t>Click to edit Master text styles</a:t>
             </a:r>
           </a:p>
@@ -1443,38 +1429,37 @@
           <a:p>
             <a:pPr lvl="0"/>
             <a:r>
-              <a:rPr lang="en-US" smtClean="0"/>
+              <a:rPr lang="en-US"/>
               <a:t>Click to edit Master text styles</a:t>
             </a:r>
           </a:p>
           <a:p>
             <a:pPr lvl="1"/>
             <a:r>
-              <a:rPr lang="en-US" smtClean="0"/>
+              <a:rPr lang="en-US"/>
               <a:t>Second level</a:t>
             </a:r>
           </a:p>
           <a:p>
             <a:pPr lvl="2"/>
             <a:r>
-              <a:rPr lang="en-US" smtClean="0"/>
+              <a:rPr lang="en-US"/>
               <a:t>Third level</a:t>
             </a:r>
           </a:p>
           <a:p>
             <a:pPr lvl="3"/>
             <a:r>
-              <a:rPr lang="en-US" smtClean="0"/>
+              <a:rPr lang="en-US"/>
               <a:t>Fourth level</a:t>
             </a:r>
           </a:p>
           <a:p>
             <a:pPr lvl="4"/>
             <a:r>
-              <a:rPr lang="en-US" smtClean="0"/>
+              <a:rPr lang="en-US"/>
               <a:t>Fifth level</a:t>
             </a:r>
-            <a:endParaRPr lang="en-US"/>
           </a:p>
         </p:txBody>
       </p:sp>
@@ -1537,7 +1522,7 @@
           <a:p>
             <a:pPr lvl="0"/>
             <a:r>
-              <a:rPr lang="en-US" smtClean="0"/>
+              <a:rPr lang="en-US"/>
               <a:t>Click to edit Master text styles</a:t>
             </a:r>
           </a:p>
@@ -1565,38 +1550,37 @@
           <a:p>
             <a:pPr lvl="0"/>
             <a:r>
-              <a:rPr lang="en-US" smtClean="0"/>
+              <a:rPr lang="en-US"/>
               <a:t>Click to edit Master text styles</a:t>
             </a:r>
           </a:p>
           <a:p>
             <a:pPr lvl="1"/>
             <a:r>
-              <a:rPr lang="en-US" smtClean="0"/>
+              <a:rPr lang="en-US"/>
               <a:t>Second level</a:t>
             </a:r>
           </a:p>
           <a:p>
             <a:pPr lvl="2"/>
             <a:r>
-              <a:rPr lang="en-US" smtClean="0"/>
+              <a:rPr lang="en-US"/>
               <a:t>Third level</a:t>
             </a:r>
           </a:p>
           <a:p>
             <a:pPr lvl="3"/>
             <a:r>
-              <a:rPr lang="en-US" smtClean="0"/>
+              <a:rPr lang="en-US"/>
               <a:t>Fourth level</a:t>
             </a:r>
           </a:p>
           <a:p>
             <a:pPr lvl="4"/>
             <a:r>
-              <a:rPr lang="en-US" smtClean="0"/>
+              <a:rPr lang="en-US"/>
               <a:t>Fifth level</a:t>
             </a:r>
-            <a:endParaRPr lang="en-US"/>
           </a:p>
         </p:txBody>
       </p:sp>
@@ -1617,7 +1601,7 @@
           <a:p>
             <a:fld id="{C2A2D427-75E2-4B45-A8AF-DF4EC7D5D4CC}" type="datetimeFigureOut">
               <a:rPr lang="en-US" smtClean="0"/>
-              <a:t>7/1/2019</a:t>
+              <a:t>9/15/20</a:t>
             </a:fld>
             <a:endParaRPr lang="en-US"/>
           </a:p>
@@ -1711,10 +1695,9 @@
           <a:lstStyle/>
           <a:p>
             <a:r>
-              <a:rPr lang="en-US" smtClean="0"/>
+              <a:rPr lang="en-US"/>
               <a:t>Click to edit Master title style</a:t>
             </a:r>
-            <a:endParaRPr lang="en-US"/>
           </a:p>
         </p:txBody>
       </p:sp>
@@ -1735,7 +1718,7 @@
           <a:p>
             <a:fld id="{C2A2D427-75E2-4B45-A8AF-DF4EC7D5D4CC}" type="datetimeFigureOut">
               <a:rPr lang="en-US" smtClean="0"/>
-              <a:t>7/1/2019</a:t>
+              <a:t>9/15/20</a:t>
             </a:fld>
             <a:endParaRPr lang="en-US"/>
           </a:p>
@@ -1830,7 +1813,7 @@
           <a:p>
             <a:fld id="{C2A2D427-75E2-4B45-A8AF-DF4EC7D5D4CC}" type="datetimeFigureOut">
               <a:rPr lang="en-US" smtClean="0"/>
-              <a:t>7/1/2019</a:t>
+              <a:t>9/15/20</a:t>
             </a:fld>
             <a:endParaRPr lang="en-US"/>
           </a:p>
@@ -1933,10 +1916,9 @@
           </a:lstStyle>
           <a:p>
             <a:r>
-              <a:rPr lang="en-US" smtClean="0"/>
+              <a:rPr lang="en-US"/>
               <a:t>Click to edit Master title style</a:t>
             </a:r>
-            <a:endParaRPr lang="en-US"/>
           </a:p>
         </p:txBody>
       </p:sp>
@@ -1990,38 +1972,37 @@
           <a:p>
             <a:pPr lvl="0"/>
             <a:r>
-              <a:rPr lang="en-US" smtClean="0"/>
+              <a:rPr lang="en-US"/>
               <a:t>Click to edit Master text styles</a:t>
             </a:r>
           </a:p>
           <a:p>
             <a:pPr lvl="1"/>
             <a:r>
-              <a:rPr lang="en-US" smtClean="0"/>
+              <a:rPr lang="en-US"/>
               <a:t>Second level</a:t>
             </a:r>
           </a:p>
           <a:p>
             <a:pPr lvl="2"/>
             <a:r>
-              <a:rPr lang="en-US" smtClean="0"/>
+              <a:rPr lang="en-US"/>
               <a:t>Third level</a:t>
             </a:r>
           </a:p>
           <a:p>
             <a:pPr lvl="3"/>
             <a:r>
-              <a:rPr lang="en-US" smtClean="0"/>
+              <a:rPr lang="en-US"/>
               <a:t>Fourth level</a:t>
             </a:r>
           </a:p>
           <a:p>
             <a:pPr lvl="4"/>
             <a:r>
-              <a:rPr lang="en-US" smtClean="0"/>
+              <a:rPr lang="en-US"/>
               <a:t>Fifth level</a:t>
             </a:r>
-            <a:endParaRPr lang="en-US"/>
           </a:p>
         </p:txBody>
       </p:sp>
@@ -2084,7 +2065,7 @@
           <a:p>
             <a:pPr lvl="0"/>
             <a:r>
-              <a:rPr lang="en-US" smtClean="0"/>
+              <a:rPr lang="en-US"/>
               <a:t>Click to edit Master text styles</a:t>
             </a:r>
           </a:p>
@@ -2107,7 +2088,7 @@
           <a:p>
             <a:fld id="{C2A2D427-75E2-4B45-A8AF-DF4EC7D5D4CC}" type="datetimeFigureOut">
               <a:rPr lang="en-US" smtClean="0"/>
-              <a:t>7/1/2019</a:t>
+              <a:t>9/15/20</a:t>
             </a:fld>
             <a:endParaRPr lang="en-US"/>
           </a:p>
@@ -2210,10 +2191,9 @@
           </a:lstStyle>
           <a:p>
             <a:r>
-              <a:rPr lang="en-US" smtClean="0"/>
+              <a:rPr lang="en-US"/>
               <a:t>Click to edit Master title style</a:t>
             </a:r>
-            <a:endParaRPr lang="en-US"/>
           </a:p>
         </p:txBody>
       </p:sp>
@@ -2337,7 +2317,7 @@
           <a:p>
             <a:pPr lvl="0"/>
             <a:r>
-              <a:rPr lang="en-US" smtClean="0"/>
+              <a:rPr lang="en-US"/>
               <a:t>Click to edit Master text styles</a:t>
             </a:r>
           </a:p>
@@ -2360,7 +2340,7 @@
           <a:p>
             <a:fld id="{C2A2D427-75E2-4B45-A8AF-DF4EC7D5D4CC}" type="datetimeFigureOut">
               <a:rPr lang="en-US" smtClean="0"/>
-              <a:t>7/1/2019</a:t>
+              <a:t>9/15/20</a:t>
             </a:fld>
             <a:endParaRPr lang="en-US"/>
           </a:p>
@@ -2469,10 +2449,9 @@
           <a:lstStyle/>
           <a:p>
             <a:r>
-              <a:rPr lang="en-US" smtClean="0"/>
+              <a:rPr lang="en-US"/>
               <a:t>Click to edit Master title style</a:t>
             </a:r>
-            <a:endParaRPr lang="en-US"/>
           </a:p>
         </p:txBody>
       </p:sp>
@@ -2503,38 +2482,37 @@
           <a:p>
             <a:pPr lvl="0"/>
             <a:r>
-              <a:rPr lang="en-US" smtClean="0"/>
+              <a:rPr lang="en-US"/>
               <a:t>Click to edit Master text styles</a:t>
             </a:r>
           </a:p>
           <a:p>
             <a:pPr lvl="1"/>
             <a:r>
-              <a:rPr lang="en-US" smtClean="0"/>
+              <a:rPr lang="en-US"/>
               <a:t>Second level</a:t>
             </a:r>
           </a:p>
           <a:p>
             <a:pPr lvl="2"/>
             <a:r>
-              <a:rPr lang="en-US" smtClean="0"/>
+              <a:rPr lang="en-US"/>
               <a:t>Third level</a:t>
             </a:r>
           </a:p>
           <a:p>
             <a:pPr lvl="3"/>
             <a:r>
-              <a:rPr lang="en-US" smtClean="0"/>
+              <a:rPr lang="en-US"/>
               <a:t>Fourth level</a:t>
             </a:r>
           </a:p>
           <a:p>
             <a:pPr lvl="4"/>
             <a:r>
-              <a:rPr lang="en-US" smtClean="0"/>
+              <a:rPr lang="en-US"/>
               <a:t>Fifth level</a:t>
             </a:r>
-            <a:endParaRPr lang="en-US"/>
           </a:p>
         </p:txBody>
       </p:sp>
@@ -2573,7 +2551,7 @@
           <a:p>
             <a:fld id="{C2A2D427-75E2-4B45-A8AF-DF4EC7D5D4CC}" type="datetimeFigureOut">
               <a:rPr lang="en-US" smtClean="0"/>
-              <a:t>7/1/2019</a:t>
+              <a:t>9/15/20</a:t>
             </a:fld>
             <a:endParaRPr lang="en-US"/>
           </a:p>
@@ -2994,10 +2972,9 @@
           <a:lstStyle/>
           <a:p>
             <a:r>
-              <a:rPr lang="en-US" dirty="0" smtClean="0"/>
-              <a:t>Basic Rules for Clean Data</a:t>
-            </a:r>
-            <a:endParaRPr lang="en-US" dirty="0"/>
+              <a:rPr lang="en-US" dirty="0"/>
+              <a:t>Data Terminology, Formatting and Best Practices</a:t>
+            </a:r>
           </a:p>
         </p:txBody>
       </p:sp>
@@ -3014,7 +2991,7 @@
 </p:sld>
 </file>
 
-<file path=ppt/slides/slide10.xml><?xml version="1.0" encoding="utf-8"?>
+<file path=ppt/slides/slide2.xml><?xml version="1.0" encoding="utf-8"?>
 <p:sld xmlns:a="http://schemas.openxmlformats.org/drawingml/2006/main" xmlns:r="http://schemas.openxmlformats.org/officeDocument/2006/relationships" xmlns:p="http://schemas.openxmlformats.org/presentationml/2006/main">
   <p:cSld>
     <p:spTree>
@@ -3033,6 +3010,573 @@
       </p:grpSpPr>
       <p:sp>
         <p:nvSpPr>
+          <p:cNvPr id="4" name="Title 1"/>
+          <p:cNvSpPr>
+            <a:spLocks noGrp="1"/>
+          </p:cNvSpPr>
+          <p:nvPr>
+            <p:ph type="title"/>
+          </p:nvPr>
+        </p:nvSpPr>
+        <p:spPr/>
+        <p:txBody>
+          <a:bodyPr/>
+          <a:lstStyle/>
+          <a:p>
+            <a:r>
+              <a:rPr lang="en-US" dirty="0"/>
+              <a:t>Plan – Think Before You Type</a:t>
+            </a:r>
+          </a:p>
+        </p:txBody>
+      </p:sp>
+      <p:sp>
+        <p:nvSpPr>
+          <p:cNvPr id="5" name="Content Placeholder 2"/>
+          <p:cNvSpPr>
+            <a:spLocks noGrp="1"/>
+          </p:cNvSpPr>
+          <p:nvPr>
+            <p:ph idx="1"/>
+          </p:nvPr>
+        </p:nvSpPr>
+        <p:spPr/>
+        <p:txBody>
+          <a:bodyPr/>
+          <a:lstStyle/>
+          <a:p>
+            <a:r>
+              <a:rPr lang="en-US" dirty="0"/>
+              <a:t>More important than:</a:t>
+            </a:r>
+          </a:p>
+          <a:p>
+            <a:pPr lvl="1"/>
+            <a:r>
+              <a:rPr lang="en-US" dirty="0"/>
+              <a:t>Formulas</a:t>
+            </a:r>
+          </a:p>
+          <a:p>
+            <a:pPr lvl="1"/>
+            <a:r>
+              <a:rPr lang="en-US" dirty="0"/>
+              <a:t>Which program you use</a:t>
+            </a:r>
+          </a:p>
+          <a:p>
+            <a:pPr lvl="1"/>
+            <a:r>
+              <a:rPr lang="en-US" dirty="0"/>
+              <a:t>Fancy formatting</a:t>
+            </a:r>
+          </a:p>
+          <a:p>
+            <a:r>
+              <a:rPr lang="en-US" dirty="0"/>
+              <a:t>Please, please, please, take the time to do this, even in a hectic situation.</a:t>
+            </a:r>
+          </a:p>
+        </p:txBody>
+      </p:sp>
+    </p:spTree>
+    <p:extLst>
+      <p:ext uri="{BB962C8B-B14F-4D97-AF65-F5344CB8AC3E}">
+        <p14:creationId xmlns:p14="http://schemas.microsoft.com/office/powerpoint/2010/main" val="2155030288"/>
+      </p:ext>
+    </p:extLst>
+  </p:cSld>
+  <p:clrMapOvr>
+    <a:masterClrMapping/>
+  </p:clrMapOvr>
+</p:sld>
+</file>
+
+<file path=ppt/slides/slide3.xml><?xml version="1.0" encoding="utf-8"?>
+<p:sld xmlns:a="http://schemas.openxmlformats.org/drawingml/2006/main" xmlns:r="http://schemas.openxmlformats.org/officeDocument/2006/relationships" xmlns:p="http://schemas.openxmlformats.org/presentationml/2006/main">
+  <p:cSld>
+    <p:spTree>
+      <p:nvGrpSpPr>
+        <p:cNvPr id="1" name=""/>
+        <p:cNvGrpSpPr/>
+        <p:nvPr/>
+      </p:nvGrpSpPr>
+      <p:grpSpPr>
+        <a:xfrm>
+          <a:off x="0" y="0"/>
+          <a:ext cx="0" cy="0"/>
+          <a:chOff x="0" y="0"/>
+          <a:chExt cx="0" cy="0"/>
+        </a:xfrm>
+      </p:grpSpPr>
+      <p:sp>
+        <p:nvSpPr>
+          <p:cNvPr id="4" name="Title 1"/>
+          <p:cNvSpPr>
+            <a:spLocks noGrp="1"/>
+          </p:cNvSpPr>
+          <p:nvPr>
+            <p:ph type="title"/>
+          </p:nvPr>
+        </p:nvSpPr>
+        <p:spPr/>
+        <p:txBody>
+          <a:bodyPr/>
+          <a:lstStyle/>
+          <a:p>
+            <a:r>
+              <a:rPr lang="en-US" dirty="0"/>
+              <a:t>Plan – Four Rules to Keep Tables Simple</a:t>
+            </a:r>
+          </a:p>
+        </p:txBody>
+      </p:sp>
+      <p:sp>
+        <p:nvSpPr>
+          <p:cNvPr id="5" name="Content Placeholder 2"/>
+          <p:cNvSpPr>
+            <a:spLocks noGrp="1"/>
+          </p:cNvSpPr>
+          <p:nvPr>
+            <p:ph idx="1"/>
+          </p:nvPr>
+        </p:nvSpPr>
+        <p:spPr/>
+        <p:txBody>
+          <a:bodyPr/>
+          <a:lstStyle/>
+          <a:p>
+            <a:r>
+              <a:rPr lang="en-US" dirty="0"/>
+              <a:t>One row per observation</a:t>
+            </a:r>
+          </a:p>
+          <a:p>
+            <a:r>
+              <a:rPr lang="en-US" dirty="0"/>
+              <a:t>All rows in table contain the same type of observation</a:t>
+            </a:r>
+          </a:p>
+          <a:p>
+            <a:r>
+              <a:rPr lang="en-US" dirty="0"/>
+              <a:t>Each cell only contains one piece of information</a:t>
+            </a:r>
+          </a:p>
+          <a:p>
+            <a:r>
+              <a:rPr lang="en-US" dirty="0"/>
+              <a:t>No duplicative columns (i.e. Date of First Contact, Date of Second Contact)</a:t>
+            </a:r>
+          </a:p>
+          <a:p>
+            <a:r>
+              <a:rPr lang="en-US" dirty="0"/>
+              <a:t>But what if you think you need duplicative columns?</a:t>
+            </a:r>
+          </a:p>
+        </p:txBody>
+      </p:sp>
+    </p:spTree>
+    <p:extLst>
+      <p:ext uri="{BB962C8B-B14F-4D97-AF65-F5344CB8AC3E}">
+        <p14:creationId xmlns:p14="http://schemas.microsoft.com/office/powerpoint/2010/main" val="2671365705"/>
+      </p:ext>
+    </p:extLst>
+  </p:cSld>
+  <p:clrMapOvr>
+    <a:masterClrMapping/>
+  </p:clrMapOvr>
+</p:sld>
+</file>
+
+<file path=ppt/slides/slide4.xml><?xml version="1.0" encoding="utf-8"?>
+<p:sld xmlns:a="http://schemas.openxmlformats.org/drawingml/2006/main" xmlns:r="http://schemas.openxmlformats.org/officeDocument/2006/relationships" xmlns:p="http://schemas.openxmlformats.org/presentationml/2006/main">
+  <p:cSld>
+    <p:spTree>
+      <p:nvGrpSpPr>
+        <p:cNvPr id="1" name=""/>
+        <p:cNvGrpSpPr/>
+        <p:nvPr/>
+      </p:nvGrpSpPr>
+      <p:grpSpPr>
+        <a:xfrm>
+          <a:off x="0" y="0"/>
+          <a:ext cx="0" cy="0"/>
+          <a:chOff x="0" y="0"/>
+          <a:chExt cx="0" cy="0"/>
+        </a:xfrm>
+      </p:grpSpPr>
+      <p:sp>
+        <p:nvSpPr>
+          <p:cNvPr id="4" name="Title 1"/>
+          <p:cNvSpPr>
+            <a:spLocks noGrp="1"/>
+          </p:cNvSpPr>
+          <p:nvPr>
+            <p:ph type="title"/>
+          </p:nvPr>
+        </p:nvSpPr>
+        <p:spPr/>
+        <p:txBody>
+          <a:bodyPr>
+            <a:normAutofit/>
+          </a:bodyPr>
+          <a:lstStyle/>
+          <a:p>
+            <a:r>
+              <a:rPr lang="en-US" dirty="0"/>
+              <a:t>Plan – When to Make a New Table for a New Information Type </a:t>
+            </a:r>
+          </a:p>
+        </p:txBody>
+      </p:sp>
+      <p:sp>
+        <p:nvSpPr>
+          <p:cNvPr id="5" name="Rounded Rectangle 4"/>
+          <p:cNvSpPr/>
+          <p:nvPr/>
+        </p:nvSpPr>
+        <p:spPr>
+          <a:xfrm>
+            <a:off x="4021493" y="2323061"/>
+            <a:ext cx="3763489" cy="1193961"/>
+          </a:xfrm>
+          <a:prstGeom prst="roundRect">
+            <a:avLst/>
+          </a:prstGeom>
+        </p:spPr>
+        <p:style>
+          <a:lnRef idx="2">
+            <a:schemeClr val="accent1">
+              <a:shade val="50000"/>
+            </a:schemeClr>
+          </a:lnRef>
+          <a:fillRef idx="1">
+            <a:schemeClr val="accent1"/>
+          </a:fillRef>
+          <a:effectRef idx="0">
+            <a:schemeClr val="accent1"/>
+          </a:effectRef>
+          <a:fontRef idx="minor">
+            <a:schemeClr val="lt1"/>
+          </a:fontRef>
+        </p:style>
+        <p:txBody>
+          <a:bodyPr rtlCol="0" anchor="ctr"/>
+          <a:lstStyle/>
+          <a:p>
+            <a:pPr algn="ctr"/>
+            <a:r>
+              <a:rPr lang="en-US" dirty="0"/>
+              <a:t>Can a Victim Have More Than One? (i.e. more than one hospital form, more than one NOK phone number, more than one date of birth)</a:t>
+            </a:r>
+          </a:p>
+        </p:txBody>
+      </p:sp>
+      <p:sp>
+        <p:nvSpPr>
+          <p:cNvPr id="6" name="Down Arrow 5"/>
+          <p:cNvSpPr/>
+          <p:nvPr/>
+        </p:nvSpPr>
+        <p:spPr>
+          <a:xfrm rot="2081282">
+            <a:off x="4336756" y="3529153"/>
+            <a:ext cx="775125" cy="1349997"/>
+          </a:xfrm>
+          <a:prstGeom prst="downArrow">
+            <a:avLst/>
+          </a:prstGeom>
+        </p:spPr>
+        <p:style>
+          <a:lnRef idx="2">
+            <a:schemeClr val="accent1">
+              <a:shade val="50000"/>
+            </a:schemeClr>
+          </a:lnRef>
+          <a:fillRef idx="1">
+            <a:schemeClr val="accent1"/>
+          </a:fillRef>
+          <a:effectRef idx="0">
+            <a:schemeClr val="accent1"/>
+          </a:effectRef>
+          <a:fontRef idx="minor">
+            <a:schemeClr val="lt1"/>
+          </a:fontRef>
+        </p:style>
+        <p:txBody>
+          <a:bodyPr rtlCol="0" anchor="ctr"/>
+          <a:lstStyle/>
+          <a:p>
+            <a:pPr algn="ctr"/>
+            <a:r>
+              <a:rPr lang="en-US" dirty="0"/>
+              <a:t>Ye</a:t>
+            </a:r>
+          </a:p>
+          <a:p>
+            <a:pPr algn="ctr"/>
+            <a:r>
+              <a:rPr lang="en-US" dirty="0"/>
+              <a:t>s</a:t>
+            </a:r>
+          </a:p>
+        </p:txBody>
+      </p:sp>
+      <p:sp>
+        <p:nvSpPr>
+          <p:cNvPr id="7" name="Down Arrow 6"/>
+          <p:cNvSpPr/>
+          <p:nvPr/>
+        </p:nvSpPr>
+        <p:spPr>
+          <a:xfrm rot="19447084">
+            <a:off x="6600552" y="3530686"/>
+            <a:ext cx="775125" cy="1349997"/>
+          </a:xfrm>
+          <a:prstGeom prst="downArrow">
+            <a:avLst/>
+          </a:prstGeom>
+        </p:spPr>
+        <p:style>
+          <a:lnRef idx="2">
+            <a:schemeClr val="accent1">
+              <a:shade val="50000"/>
+            </a:schemeClr>
+          </a:lnRef>
+          <a:fillRef idx="1">
+            <a:schemeClr val="accent1"/>
+          </a:fillRef>
+          <a:effectRef idx="0">
+            <a:schemeClr val="accent1"/>
+          </a:effectRef>
+          <a:fontRef idx="minor">
+            <a:schemeClr val="lt1"/>
+          </a:fontRef>
+        </p:style>
+        <p:txBody>
+          <a:bodyPr rtlCol="0" anchor="ctr"/>
+          <a:lstStyle/>
+          <a:p>
+            <a:pPr algn="ctr"/>
+            <a:r>
+              <a:rPr lang="en-US" dirty="0"/>
+              <a:t>N</a:t>
+            </a:r>
+          </a:p>
+          <a:p>
+            <a:pPr algn="ctr"/>
+            <a:r>
+              <a:rPr lang="en-US" dirty="0"/>
+              <a:t>o</a:t>
+            </a:r>
+          </a:p>
+        </p:txBody>
+      </p:sp>
+      <p:sp>
+        <p:nvSpPr>
+          <p:cNvPr id="8" name="Rounded Rectangle 7"/>
+          <p:cNvSpPr/>
+          <p:nvPr/>
+        </p:nvSpPr>
+        <p:spPr>
+          <a:xfrm>
+            <a:off x="3104579" y="4976675"/>
+            <a:ext cx="2219163" cy="793102"/>
+          </a:xfrm>
+          <a:prstGeom prst="roundRect">
+            <a:avLst/>
+          </a:prstGeom>
+        </p:spPr>
+        <p:style>
+          <a:lnRef idx="2">
+            <a:schemeClr val="accent1">
+              <a:shade val="50000"/>
+            </a:schemeClr>
+          </a:lnRef>
+          <a:fillRef idx="1">
+            <a:schemeClr val="accent1"/>
+          </a:fillRef>
+          <a:effectRef idx="0">
+            <a:schemeClr val="accent1"/>
+          </a:effectRef>
+          <a:fontRef idx="minor">
+            <a:schemeClr val="lt1"/>
+          </a:fontRef>
+        </p:style>
+        <p:txBody>
+          <a:bodyPr rtlCol="0" anchor="ctr"/>
+          <a:lstStyle/>
+          <a:p>
+            <a:pPr algn="ctr"/>
+            <a:r>
+              <a:rPr lang="en-US" dirty="0"/>
+              <a:t>Make a new table</a:t>
+            </a:r>
+          </a:p>
+        </p:txBody>
+      </p:sp>
+      <p:sp>
+        <p:nvSpPr>
+          <p:cNvPr id="9" name="Rounded Rectangle 8"/>
+          <p:cNvSpPr/>
+          <p:nvPr/>
+        </p:nvSpPr>
+        <p:spPr>
+          <a:xfrm>
+            <a:off x="6588173" y="4979741"/>
+            <a:ext cx="2219163" cy="793102"/>
+          </a:xfrm>
+          <a:prstGeom prst="roundRect">
+            <a:avLst/>
+          </a:prstGeom>
+        </p:spPr>
+        <p:style>
+          <a:lnRef idx="2">
+            <a:schemeClr val="accent1">
+              <a:shade val="50000"/>
+            </a:schemeClr>
+          </a:lnRef>
+          <a:fillRef idx="1">
+            <a:schemeClr val="accent1"/>
+          </a:fillRef>
+          <a:effectRef idx="0">
+            <a:schemeClr val="accent1"/>
+          </a:effectRef>
+          <a:fontRef idx="minor">
+            <a:schemeClr val="lt1"/>
+          </a:fontRef>
+        </p:style>
+        <p:txBody>
+          <a:bodyPr rtlCol="0" anchor="ctr"/>
+          <a:lstStyle/>
+          <a:p>
+            <a:pPr algn="ctr"/>
+            <a:r>
+              <a:rPr lang="en-US" dirty="0"/>
+              <a:t>Make new column(s) in the main table or make a new table</a:t>
+            </a:r>
+          </a:p>
+        </p:txBody>
+      </p:sp>
+    </p:spTree>
+    <p:extLst>
+      <p:ext uri="{BB962C8B-B14F-4D97-AF65-F5344CB8AC3E}">
+        <p14:creationId xmlns:p14="http://schemas.microsoft.com/office/powerpoint/2010/main" val="3646340457"/>
+      </p:ext>
+    </p:extLst>
+  </p:cSld>
+  <p:clrMapOvr>
+    <a:masterClrMapping/>
+  </p:clrMapOvr>
+</p:sld>
+</file>
+
+<file path=ppt/slides/slide5.xml><?xml version="1.0" encoding="utf-8"?>
+<p:sld xmlns:a="http://schemas.openxmlformats.org/drawingml/2006/main" xmlns:r="http://schemas.openxmlformats.org/officeDocument/2006/relationships" xmlns:p="http://schemas.openxmlformats.org/presentationml/2006/main">
+  <p:cSld>
+    <p:spTree>
+      <p:nvGrpSpPr>
+        <p:cNvPr id="1" name=""/>
+        <p:cNvGrpSpPr/>
+        <p:nvPr/>
+      </p:nvGrpSpPr>
+      <p:grpSpPr>
+        <a:xfrm>
+          <a:off x="0" y="0"/>
+          <a:ext cx="0" cy="0"/>
+          <a:chOff x="0" y="0"/>
+          <a:chExt cx="0" cy="0"/>
+        </a:xfrm>
+      </p:grpSpPr>
+      <p:sp>
+        <p:nvSpPr>
+          <p:cNvPr id="4" name="Title 1"/>
+          <p:cNvSpPr>
+            <a:spLocks noGrp="1"/>
+          </p:cNvSpPr>
+          <p:nvPr>
+            <p:ph type="title"/>
+          </p:nvPr>
+        </p:nvSpPr>
+        <p:spPr/>
+        <p:txBody>
+          <a:bodyPr/>
+          <a:lstStyle/>
+          <a:p>
+            <a:r>
+              <a:rPr lang="en-US" dirty="0"/>
+              <a:t>Plan – Keys</a:t>
+            </a:r>
+          </a:p>
+        </p:txBody>
+      </p:sp>
+      <p:sp>
+        <p:nvSpPr>
+          <p:cNvPr id="5" name="Content Placeholder 2"/>
+          <p:cNvSpPr>
+            <a:spLocks noGrp="1"/>
+          </p:cNvSpPr>
+          <p:nvPr>
+            <p:ph idx="1"/>
+          </p:nvPr>
+        </p:nvSpPr>
+        <p:spPr>
+          <a:xfrm>
+            <a:off x="1141412" y="2249487"/>
+            <a:ext cx="9905999" cy="3541714"/>
+          </a:xfrm>
+        </p:spPr>
+        <p:txBody>
+          <a:bodyPr/>
+          <a:lstStyle/>
+          <a:p>
+            <a:r>
+              <a:rPr lang="en-US" dirty="0"/>
+              <a:t>If you have multiple tables, you must link them using unique ID numbers</a:t>
+            </a:r>
+          </a:p>
+          <a:p>
+            <a:r>
+              <a:rPr lang="en-US" dirty="0"/>
+              <a:t>Even if you have one table, having an ID number is a good idea</a:t>
+            </a:r>
+          </a:p>
+        </p:txBody>
+      </p:sp>
+    </p:spTree>
+    <p:extLst>
+      <p:ext uri="{BB962C8B-B14F-4D97-AF65-F5344CB8AC3E}">
+        <p14:creationId xmlns:p14="http://schemas.microsoft.com/office/powerpoint/2010/main" val="1856329535"/>
+      </p:ext>
+    </p:extLst>
+  </p:cSld>
+  <p:clrMapOvr>
+    <a:masterClrMapping/>
+  </p:clrMapOvr>
+</p:sld>
+</file>
+
+<file path=ppt/slides/slide6.xml><?xml version="1.0" encoding="utf-8"?>
+<p:sld xmlns:a="http://schemas.openxmlformats.org/drawingml/2006/main" xmlns:r="http://schemas.openxmlformats.org/officeDocument/2006/relationships" xmlns:p="http://schemas.openxmlformats.org/presentationml/2006/main">
+  <p:cSld>
+    <p:spTree>
+      <p:nvGrpSpPr>
+        <p:cNvPr id="1" name=""/>
+        <p:cNvGrpSpPr/>
+        <p:nvPr/>
+      </p:nvGrpSpPr>
+      <p:grpSpPr>
+        <a:xfrm>
+          <a:off x="0" y="0"/>
+          <a:ext cx="0" cy="0"/>
+          <a:chOff x="0" y="0"/>
+          <a:chExt cx="0" cy="0"/>
+        </a:xfrm>
+      </p:grpSpPr>
+      <p:sp>
+        <p:nvSpPr>
           <p:cNvPr id="2" name="Title 1"/>
           <p:cNvSpPr>
             <a:spLocks noGrp="1"/>
@@ -3047,10 +3591,690 @@
           <a:lstStyle/>
           <a:p>
             <a:r>
-              <a:rPr lang="en-US" dirty="0" smtClean="0"/>
+              <a:rPr lang="en-US" dirty="0"/>
+              <a:t>Tabular Data Formats</a:t>
+            </a:r>
+          </a:p>
+        </p:txBody>
+      </p:sp>
+      <p:sp>
+        <p:nvSpPr>
+          <p:cNvPr id="3" name="Content Placeholder 2"/>
+          <p:cNvSpPr>
+            <a:spLocks noGrp="1"/>
+          </p:cNvSpPr>
+          <p:nvPr>
+            <p:ph idx="1"/>
+          </p:nvPr>
+        </p:nvSpPr>
+        <p:spPr/>
+        <p:txBody>
+          <a:bodyPr/>
+          <a:lstStyle/>
+          <a:p>
+            <a:r>
+              <a:rPr lang="en-US" dirty="0"/>
+              <a:t>CSV</a:t>
+            </a:r>
+          </a:p>
+          <a:p>
+            <a:r>
+              <a:rPr lang="en-US" dirty="0"/>
+              <a:t>Excel</a:t>
+            </a:r>
+          </a:p>
+          <a:p>
+            <a:r>
+              <a:rPr lang="en-US" dirty="0"/>
+              <a:t>Access</a:t>
+            </a:r>
+          </a:p>
+        </p:txBody>
+      </p:sp>
+    </p:spTree>
+    <p:extLst>
+      <p:ext uri="{BB962C8B-B14F-4D97-AF65-F5344CB8AC3E}">
+        <p14:creationId xmlns:p14="http://schemas.microsoft.com/office/powerpoint/2010/main" val="2352723395"/>
+      </p:ext>
+    </p:extLst>
+  </p:cSld>
+  <p:clrMapOvr>
+    <a:masterClrMapping/>
+  </p:clrMapOvr>
+</p:sld>
+</file>
+
+<file path=ppt/slides/slide7.xml><?xml version="1.0" encoding="utf-8"?>
+<p:sld xmlns:a="http://schemas.openxmlformats.org/drawingml/2006/main" xmlns:r="http://schemas.openxmlformats.org/officeDocument/2006/relationships" xmlns:p="http://schemas.openxmlformats.org/presentationml/2006/main">
+  <p:cSld>
+    <p:spTree>
+      <p:nvGrpSpPr>
+        <p:cNvPr id="1" name=""/>
+        <p:cNvGrpSpPr/>
+        <p:nvPr/>
+      </p:nvGrpSpPr>
+      <p:grpSpPr>
+        <a:xfrm>
+          <a:off x="0" y="0"/>
+          <a:ext cx="0" cy="0"/>
+          <a:chOff x="0" y="0"/>
+          <a:chExt cx="0" cy="0"/>
+        </a:xfrm>
+      </p:grpSpPr>
+      <p:sp>
+        <p:nvSpPr>
+          <p:cNvPr id="2" name="Title 1"/>
+          <p:cNvSpPr>
+            <a:spLocks noGrp="1"/>
+          </p:cNvSpPr>
+          <p:nvPr>
+            <p:ph type="title"/>
+          </p:nvPr>
+        </p:nvSpPr>
+        <p:spPr/>
+        <p:txBody>
+          <a:bodyPr/>
+          <a:lstStyle/>
+          <a:p>
+            <a:r>
+              <a:rPr lang="en-US" dirty="0"/>
+              <a:t>Non-Tabular Data Formats</a:t>
+            </a:r>
+          </a:p>
+        </p:txBody>
+      </p:sp>
+      <p:sp>
+        <p:nvSpPr>
+          <p:cNvPr id="3" name="Content Placeholder 2"/>
+          <p:cNvSpPr>
+            <a:spLocks noGrp="1"/>
+          </p:cNvSpPr>
+          <p:nvPr>
+            <p:ph idx="1"/>
+          </p:nvPr>
+        </p:nvSpPr>
+        <p:spPr/>
+        <p:txBody>
+          <a:bodyPr/>
+          <a:lstStyle/>
+          <a:p>
+            <a:r>
+              <a:rPr lang="en-US" dirty="0"/>
+              <a:t>JSON</a:t>
+            </a:r>
+          </a:p>
+          <a:p>
+            <a:r>
+              <a:rPr lang="en-US" dirty="0"/>
+              <a:t>HTML/XML</a:t>
+            </a:r>
+          </a:p>
+          <a:p>
+            <a:r>
+              <a:rPr lang="en-US" dirty="0"/>
+              <a:t>Raw text</a:t>
+            </a:r>
+          </a:p>
+        </p:txBody>
+      </p:sp>
+    </p:spTree>
+    <p:extLst>
+      <p:ext uri="{BB962C8B-B14F-4D97-AF65-F5344CB8AC3E}">
+        <p14:creationId xmlns:p14="http://schemas.microsoft.com/office/powerpoint/2010/main" val="1739692630"/>
+      </p:ext>
+    </p:extLst>
+  </p:cSld>
+  <p:clrMapOvr>
+    <a:masterClrMapping/>
+  </p:clrMapOvr>
+</p:sld>
+</file>
+
+<file path=ppt/slides/slide8.xml><?xml version="1.0" encoding="utf-8"?>
+<p:sld xmlns:a="http://schemas.openxmlformats.org/drawingml/2006/main" xmlns:r="http://schemas.openxmlformats.org/officeDocument/2006/relationships" xmlns:p="http://schemas.openxmlformats.org/presentationml/2006/main">
+  <p:cSld>
+    <p:spTree>
+      <p:nvGrpSpPr>
+        <p:cNvPr id="1" name=""/>
+        <p:cNvGrpSpPr/>
+        <p:nvPr/>
+      </p:nvGrpSpPr>
+      <p:grpSpPr>
+        <a:xfrm>
+          <a:off x="0" y="0"/>
+          <a:ext cx="0" cy="0"/>
+          <a:chOff x="0" y="0"/>
+          <a:chExt cx="0" cy="0"/>
+        </a:xfrm>
+      </p:grpSpPr>
+      <p:sp>
+        <p:nvSpPr>
+          <p:cNvPr id="2" name="Title 1"/>
+          <p:cNvSpPr>
+            <a:spLocks noGrp="1"/>
+          </p:cNvSpPr>
+          <p:nvPr>
+            <p:ph type="title"/>
+          </p:nvPr>
+        </p:nvSpPr>
+        <p:spPr/>
+        <p:txBody>
+          <a:bodyPr/>
+          <a:lstStyle/>
+          <a:p>
+            <a:r>
+              <a:rPr lang="en-US" dirty="0"/>
+              <a:t>JSON</a:t>
+            </a:r>
+          </a:p>
+        </p:txBody>
+      </p:sp>
+      <p:sp>
+        <p:nvSpPr>
+          <p:cNvPr id="5" name="Rectangle 4"/>
+          <p:cNvSpPr/>
+          <p:nvPr/>
+        </p:nvSpPr>
+        <p:spPr>
+          <a:xfrm>
+            <a:off x="4802659" y="365125"/>
+            <a:ext cx="6096000" cy="6285439"/>
+          </a:xfrm>
+          <a:prstGeom prst="rect">
+            <a:avLst/>
+          </a:prstGeom>
+        </p:spPr>
+        <p:txBody>
+          <a:bodyPr>
+            <a:spAutoFit/>
+          </a:bodyPr>
+          <a:lstStyle/>
+          <a:p>
+            <a:pPr>
+              <a:lnSpc>
+                <a:spcPct val="107000"/>
+              </a:lnSpc>
+              <a:spcAft>
+                <a:spcPts val="800"/>
+              </a:spcAft>
+            </a:pPr>
+            <a:r>
+              <a:rPr lang="en-US" sz="1200" dirty="0">
+                <a:effectLst/>
+                <a:latin typeface="Calibri" panose="020F0502020204030204" pitchFamily="34" charset="0"/>
+                <a:ea typeface="Calibri" panose="020F0502020204030204" pitchFamily="34" charset="0"/>
+                <a:cs typeface="Arial" panose="020B0604020202020204" pitchFamily="34" charset="0"/>
+              </a:rPr>
+              <a:t>{</a:t>
+            </a:r>
+          </a:p>
+          <a:p>
+            <a:pPr>
+              <a:lnSpc>
+                <a:spcPct val="107000"/>
+              </a:lnSpc>
+              <a:spcAft>
+                <a:spcPts val="800"/>
+              </a:spcAft>
+            </a:pPr>
+            <a:r>
+              <a:rPr lang="en-US" sz="1200" dirty="0">
+                <a:effectLst/>
+                <a:latin typeface="Calibri" panose="020F0502020204030204" pitchFamily="34" charset="0"/>
+                <a:ea typeface="Calibri" panose="020F0502020204030204" pitchFamily="34" charset="0"/>
+                <a:cs typeface="Arial" panose="020B0604020202020204" pitchFamily="34" charset="0"/>
+              </a:rPr>
+              <a:t>  "colors": [</a:t>
+            </a:r>
+          </a:p>
+          <a:p>
+            <a:pPr>
+              <a:lnSpc>
+                <a:spcPct val="107000"/>
+              </a:lnSpc>
+              <a:spcAft>
+                <a:spcPts val="800"/>
+              </a:spcAft>
+            </a:pPr>
+            <a:r>
+              <a:rPr lang="en-US" sz="1200" dirty="0">
+                <a:effectLst/>
+                <a:latin typeface="Calibri" panose="020F0502020204030204" pitchFamily="34" charset="0"/>
+                <a:ea typeface="Calibri" panose="020F0502020204030204" pitchFamily="34" charset="0"/>
+                <a:cs typeface="Arial" panose="020B0604020202020204" pitchFamily="34" charset="0"/>
+              </a:rPr>
+              <a:t>    {</a:t>
+            </a:r>
+          </a:p>
+          <a:p>
+            <a:pPr>
+              <a:lnSpc>
+                <a:spcPct val="107000"/>
+              </a:lnSpc>
+              <a:spcAft>
+                <a:spcPts val="800"/>
+              </a:spcAft>
+            </a:pPr>
+            <a:r>
+              <a:rPr lang="en-US" sz="1200" dirty="0">
+                <a:effectLst/>
+                <a:latin typeface="Calibri" panose="020F0502020204030204" pitchFamily="34" charset="0"/>
+                <a:ea typeface="Calibri" panose="020F0502020204030204" pitchFamily="34" charset="0"/>
+                <a:cs typeface="Arial" panose="020B0604020202020204" pitchFamily="34" charset="0"/>
+              </a:rPr>
+              <a:t>      "color": "black",</a:t>
+            </a:r>
+          </a:p>
+          <a:p>
+            <a:pPr>
+              <a:lnSpc>
+                <a:spcPct val="107000"/>
+              </a:lnSpc>
+              <a:spcAft>
+                <a:spcPts val="800"/>
+              </a:spcAft>
+            </a:pPr>
+            <a:r>
+              <a:rPr lang="en-US" sz="1200" dirty="0">
+                <a:effectLst/>
+                <a:latin typeface="Calibri" panose="020F0502020204030204" pitchFamily="34" charset="0"/>
+                <a:ea typeface="Calibri" panose="020F0502020204030204" pitchFamily="34" charset="0"/>
+                <a:cs typeface="Arial" panose="020B0604020202020204" pitchFamily="34" charset="0"/>
+              </a:rPr>
+              <a:t>      "category": "hue",</a:t>
+            </a:r>
+          </a:p>
+          <a:p>
+            <a:pPr>
+              <a:lnSpc>
+                <a:spcPct val="107000"/>
+              </a:lnSpc>
+              <a:spcAft>
+                <a:spcPts val="800"/>
+              </a:spcAft>
+            </a:pPr>
+            <a:r>
+              <a:rPr lang="en-US" sz="1200" dirty="0">
+                <a:effectLst/>
+                <a:latin typeface="Calibri" panose="020F0502020204030204" pitchFamily="34" charset="0"/>
+                <a:ea typeface="Calibri" panose="020F0502020204030204" pitchFamily="34" charset="0"/>
+                <a:cs typeface="Arial" panose="020B0604020202020204" pitchFamily="34" charset="0"/>
+              </a:rPr>
+              <a:t>      "type": "primary",</a:t>
+            </a:r>
+          </a:p>
+          <a:p>
+            <a:pPr>
+              <a:lnSpc>
+                <a:spcPct val="107000"/>
+              </a:lnSpc>
+              <a:spcAft>
+                <a:spcPts val="800"/>
+              </a:spcAft>
+            </a:pPr>
+            <a:r>
+              <a:rPr lang="en-US" sz="1200" dirty="0">
+                <a:effectLst/>
+                <a:latin typeface="Calibri" panose="020F0502020204030204" pitchFamily="34" charset="0"/>
+                <a:ea typeface="Calibri" panose="020F0502020204030204" pitchFamily="34" charset="0"/>
+                <a:cs typeface="Arial" panose="020B0604020202020204" pitchFamily="34" charset="0"/>
+              </a:rPr>
+              <a:t>      "code": {</a:t>
+            </a:r>
+          </a:p>
+          <a:p>
+            <a:pPr>
+              <a:lnSpc>
+                <a:spcPct val="107000"/>
+              </a:lnSpc>
+              <a:spcAft>
+                <a:spcPts val="800"/>
+              </a:spcAft>
+            </a:pPr>
+            <a:r>
+              <a:rPr lang="en-US" sz="1200" dirty="0">
+                <a:effectLst/>
+                <a:latin typeface="Calibri" panose="020F0502020204030204" pitchFamily="34" charset="0"/>
+                <a:ea typeface="Calibri" panose="020F0502020204030204" pitchFamily="34" charset="0"/>
+                <a:cs typeface="Arial" panose="020B0604020202020204" pitchFamily="34" charset="0"/>
+              </a:rPr>
+              <a:t>        "</a:t>
+            </a:r>
+            <a:r>
+              <a:rPr lang="en-US" sz="1200" dirty="0" err="1">
+                <a:effectLst/>
+                <a:latin typeface="Calibri" panose="020F0502020204030204" pitchFamily="34" charset="0"/>
+                <a:ea typeface="Calibri" panose="020F0502020204030204" pitchFamily="34" charset="0"/>
+                <a:cs typeface="Arial" panose="020B0604020202020204" pitchFamily="34" charset="0"/>
+              </a:rPr>
+              <a:t>rgba</a:t>
+            </a:r>
+            <a:r>
+              <a:rPr lang="en-US" sz="1200" dirty="0">
+                <a:effectLst/>
+                <a:latin typeface="Calibri" panose="020F0502020204030204" pitchFamily="34" charset="0"/>
+                <a:ea typeface="Calibri" panose="020F0502020204030204" pitchFamily="34" charset="0"/>
+                <a:cs typeface="Arial" panose="020B0604020202020204" pitchFamily="34" charset="0"/>
+              </a:rPr>
+              <a:t>": [255,255,255,1],</a:t>
+            </a:r>
+          </a:p>
+          <a:p>
+            <a:pPr>
+              <a:lnSpc>
+                <a:spcPct val="107000"/>
+              </a:lnSpc>
+              <a:spcAft>
+                <a:spcPts val="800"/>
+              </a:spcAft>
+            </a:pPr>
+            <a:r>
+              <a:rPr lang="en-US" sz="1200" dirty="0">
+                <a:effectLst/>
+                <a:latin typeface="Calibri" panose="020F0502020204030204" pitchFamily="34" charset="0"/>
+                <a:ea typeface="Calibri" panose="020F0502020204030204" pitchFamily="34" charset="0"/>
+                <a:cs typeface="Arial" panose="020B0604020202020204" pitchFamily="34" charset="0"/>
+              </a:rPr>
+              <a:t>        "hex": "#000"</a:t>
+            </a:r>
+          </a:p>
+          <a:p>
+            <a:pPr>
+              <a:lnSpc>
+                <a:spcPct val="107000"/>
+              </a:lnSpc>
+              <a:spcAft>
+                <a:spcPts val="800"/>
+              </a:spcAft>
+            </a:pPr>
+            <a:r>
+              <a:rPr lang="en-US" sz="1200" dirty="0">
+                <a:effectLst/>
+                <a:latin typeface="Calibri" panose="020F0502020204030204" pitchFamily="34" charset="0"/>
+                <a:ea typeface="Calibri" panose="020F0502020204030204" pitchFamily="34" charset="0"/>
+                <a:cs typeface="Arial" panose="020B0604020202020204" pitchFamily="34" charset="0"/>
+              </a:rPr>
+              <a:t>      }</a:t>
+            </a:r>
+          </a:p>
+          <a:p>
+            <a:pPr>
+              <a:lnSpc>
+                <a:spcPct val="107000"/>
+              </a:lnSpc>
+              <a:spcAft>
+                <a:spcPts val="800"/>
+              </a:spcAft>
+            </a:pPr>
+            <a:r>
+              <a:rPr lang="en-US" sz="1200" dirty="0">
+                <a:effectLst/>
+                <a:latin typeface="Calibri" panose="020F0502020204030204" pitchFamily="34" charset="0"/>
+                <a:ea typeface="Calibri" panose="020F0502020204030204" pitchFamily="34" charset="0"/>
+                <a:cs typeface="Arial" panose="020B0604020202020204" pitchFamily="34" charset="0"/>
+              </a:rPr>
+              <a:t>    },</a:t>
+            </a:r>
+          </a:p>
+          <a:p>
+            <a:pPr>
+              <a:lnSpc>
+                <a:spcPct val="107000"/>
+              </a:lnSpc>
+              <a:spcAft>
+                <a:spcPts val="800"/>
+              </a:spcAft>
+            </a:pPr>
+            <a:r>
+              <a:rPr lang="en-US" sz="1200" dirty="0">
+                <a:effectLst/>
+                <a:latin typeface="Calibri" panose="020F0502020204030204" pitchFamily="34" charset="0"/>
+                <a:ea typeface="Calibri" panose="020F0502020204030204" pitchFamily="34" charset="0"/>
+                <a:cs typeface="Arial" panose="020B0604020202020204" pitchFamily="34" charset="0"/>
+              </a:rPr>
+              <a:t>    {</a:t>
+            </a:r>
+          </a:p>
+          <a:p>
+            <a:pPr>
+              <a:lnSpc>
+                <a:spcPct val="107000"/>
+              </a:lnSpc>
+              <a:spcAft>
+                <a:spcPts val="800"/>
+              </a:spcAft>
+            </a:pPr>
+            <a:r>
+              <a:rPr lang="en-US" sz="1200" dirty="0">
+                <a:effectLst/>
+                <a:latin typeface="Calibri" panose="020F0502020204030204" pitchFamily="34" charset="0"/>
+                <a:ea typeface="Calibri" panose="020F0502020204030204" pitchFamily="34" charset="0"/>
+                <a:cs typeface="Arial" panose="020B0604020202020204" pitchFamily="34" charset="0"/>
+              </a:rPr>
+              <a:t>      "color": "white",</a:t>
+            </a:r>
+          </a:p>
+          <a:p>
+            <a:pPr>
+              <a:lnSpc>
+                <a:spcPct val="107000"/>
+              </a:lnSpc>
+              <a:spcAft>
+                <a:spcPts val="800"/>
+              </a:spcAft>
+            </a:pPr>
+            <a:r>
+              <a:rPr lang="en-US" sz="1200" dirty="0">
+                <a:effectLst/>
+                <a:latin typeface="Calibri" panose="020F0502020204030204" pitchFamily="34" charset="0"/>
+                <a:ea typeface="Calibri" panose="020F0502020204030204" pitchFamily="34" charset="0"/>
+                <a:cs typeface="Arial" panose="020B0604020202020204" pitchFamily="34" charset="0"/>
+              </a:rPr>
+              <a:t>      "category": "value",</a:t>
+            </a:r>
+          </a:p>
+          <a:p>
+            <a:pPr>
+              <a:lnSpc>
+                <a:spcPct val="107000"/>
+              </a:lnSpc>
+              <a:spcAft>
+                <a:spcPts val="800"/>
+              </a:spcAft>
+            </a:pPr>
+            <a:r>
+              <a:rPr lang="en-US" sz="1200" dirty="0">
+                <a:effectLst/>
+                <a:latin typeface="Calibri" panose="020F0502020204030204" pitchFamily="34" charset="0"/>
+                <a:ea typeface="Calibri" panose="020F0502020204030204" pitchFamily="34" charset="0"/>
+                <a:cs typeface="Arial" panose="020B0604020202020204" pitchFamily="34" charset="0"/>
+              </a:rPr>
+              <a:t>      "code": {</a:t>
+            </a:r>
+          </a:p>
+          <a:p>
+            <a:pPr>
+              <a:lnSpc>
+                <a:spcPct val="107000"/>
+              </a:lnSpc>
+              <a:spcAft>
+                <a:spcPts val="800"/>
+              </a:spcAft>
+            </a:pPr>
+            <a:r>
+              <a:rPr lang="en-US" sz="1200" dirty="0">
+                <a:effectLst/>
+                <a:latin typeface="Calibri" panose="020F0502020204030204" pitchFamily="34" charset="0"/>
+                <a:ea typeface="Calibri" panose="020F0502020204030204" pitchFamily="34" charset="0"/>
+                <a:cs typeface="Arial" panose="020B0604020202020204" pitchFamily="34" charset="0"/>
+              </a:rPr>
+              <a:t>        "</a:t>
+            </a:r>
+            <a:r>
+              <a:rPr lang="en-US" sz="1200" dirty="0" err="1">
+                <a:effectLst/>
+                <a:latin typeface="Calibri" panose="020F0502020204030204" pitchFamily="34" charset="0"/>
+                <a:ea typeface="Calibri" panose="020F0502020204030204" pitchFamily="34" charset="0"/>
+                <a:cs typeface="Arial" panose="020B0604020202020204" pitchFamily="34" charset="0"/>
+              </a:rPr>
+              <a:t>rgba</a:t>
+            </a:r>
+            <a:r>
+              <a:rPr lang="en-US" sz="1200" dirty="0">
+                <a:effectLst/>
+                <a:latin typeface="Calibri" panose="020F0502020204030204" pitchFamily="34" charset="0"/>
+                <a:ea typeface="Calibri" panose="020F0502020204030204" pitchFamily="34" charset="0"/>
+                <a:cs typeface="Arial" panose="020B0604020202020204" pitchFamily="34" charset="0"/>
+              </a:rPr>
+              <a:t>": [0,0,0,1],</a:t>
+            </a:r>
+          </a:p>
+          <a:p>
+            <a:pPr>
+              <a:lnSpc>
+                <a:spcPct val="107000"/>
+              </a:lnSpc>
+              <a:spcAft>
+                <a:spcPts val="800"/>
+              </a:spcAft>
+            </a:pPr>
+            <a:r>
+              <a:rPr lang="en-US" sz="1200" dirty="0">
+                <a:effectLst/>
+                <a:latin typeface="Calibri" panose="020F0502020204030204" pitchFamily="34" charset="0"/>
+                <a:ea typeface="Calibri" panose="020F0502020204030204" pitchFamily="34" charset="0"/>
+                <a:cs typeface="Arial" panose="020B0604020202020204" pitchFamily="34" charset="0"/>
+              </a:rPr>
+              <a:t>        "hex": "#FFF"</a:t>
+            </a:r>
+          </a:p>
+          <a:p>
+            <a:pPr>
+              <a:lnSpc>
+                <a:spcPct val="107000"/>
+              </a:lnSpc>
+              <a:spcAft>
+                <a:spcPts val="800"/>
+              </a:spcAft>
+            </a:pPr>
+            <a:r>
+              <a:rPr lang="en-US" sz="1200" dirty="0">
+                <a:effectLst/>
+                <a:latin typeface="Calibri" panose="020F0502020204030204" pitchFamily="34" charset="0"/>
+                <a:ea typeface="Calibri" panose="020F0502020204030204" pitchFamily="34" charset="0"/>
+                <a:cs typeface="Arial" panose="020B0604020202020204" pitchFamily="34" charset="0"/>
+              </a:rPr>
+              <a:t>      }</a:t>
+            </a:r>
+          </a:p>
+          <a:p>
+            <a:pPr>
+              <a:lnSpc>
+                <a:spcPct val="107000"/>
+              </a:lnSpc>
+              <a:spcAft>
+                <a:spcPts val="800"/>
+              </a:spcAft>
+            </a:pPr>
+            <a:r>
+              <a:rPr lang="en-US" sz="1200" dirty="0">
+                <a:effectLst/>
+                <a:latin typeface="Calibri" panose="020F0502020204030204" pitchFamily="34" charset="0"/>
+                <a:ea typeface="Calibri" panose="020F0502020204030204" pitchFamily="34" charset="0"/>
+                <a:cs typeface="Arial" panose="020B0604020202020204" pitchFamily="34" charset="0"/>
+              </a:rPr>
+              <a:t>    }</a:t>
+            </a:r>
+          </a:p>
+          <a:p>
+            <a:pPr>
+              <a:lnSpc>
+                <a:spcPct val="107000"/>
+              </a:lnSpc>
+              <a:spcAft>
+                <a:spcPts val="800"/>
+              </a:spcAft>
+            </a:pPr>
+            <a:r>
+              <a:rPr lang="en-US" sz="1200" dirty="0">
+                <a:effectLst/>
+                <a:latin typeface="Calibri" panose="020F0502020204030204" pitchFamily="34" charset="0"/>
+                <a:ea typeface="Calibri" panose="020F0502020204030204" pitchFamily="34" charset="0"/>
+                <a:cs typeface="Arial" panose="020B0604020202020204" pitchFamily="34" charset="0"/>
+              </a:rPr>
+              <a:t>  ]</a:t>
+            </a:r>
+          </a:p>
+          <a:p>
+            <a:pPr>
+              <a:lnSpc>
+                <a:spcPct val="107000"/>
+              </a:lnSpc>
+              <a:spcAft>
+                <a:spcPts val="800"/>
+              </a:spcAft>
+            </a:pPr>
+            <a:r>
+              <a:rPr lang="en-US" sz="1200" dirty="0">
+                <a:effectLst/>
+                <a:latin typeface="Calibri" panose="020F0502020204030204" pitchFamily="34" charset="0"/>
+                <a:ea typeface="Calibri" panose="020F0502020204030204" pitchFamily="34" charset="0"/>
+                <a:cs typeface="Arial" panose="020B0604020202020204" pitchFamily="34" charset="0"/>
+              </a:rPr>
+              <a:t>}</a:t>
+            </a:r>
+          </a:p>
+        </p:txBody>
+      </p:sp>
+    </p:spTree>
+    <p:extLst>
+      <p:ext uri="{BB962C8B-B14F-4D97-AF65-F5344CB8AC3E}">
+        <p14:creationId xmlns:p14="http://schemas.microsoft.com/office/powerpoint/2010/main" val="2441500091"/>
+      </p:ext>
+    </p:extLst>
+  </p:cSld>
+  <p:clrMapOvr>
+    <a:masterClrMapping/>
+  </p:clrMapOvr>
+</p:sld>
+</file>
+
+<file path=ppt/slides/slide9.xml><?xml version="1.0" encoding="utf-8"?>
+<p:sld xmlns:a="http://schemas.openxmlformats.org/drawingml/2006/main" xmlns:r="http://schemas.openxmlformats.org/officeDocument/2006/relationships" xmlns:p="http://schemas.openxmlformats.org/presentationml/2006/main">
+  <p:cSld>
+    <p:spTree>
+      <p:nvGrpSpPr>
+        <p:cNvPr id="1" name=""/>
+        <p:cNvGrpSpPr/>
+        <p:nvPr/>
+      </p:nvGrpSpPr>
+      <p:grpSpPr>
+        <a:xfrm>
+          <a:off x="0" y="0"/>
+          <a:ext cx="0" cy="0"/>
+          <a:chOff x="0" y="0"/>
+          <a:chExt cx="0" cy="0"/>
+        </a:xfrm>
+      </p:grpSpPr>
+      <p:sp>
+        <p:nvSpPr>
+          <p:cNvPr id="2" name="Title 1"/>
+          <p:cNvSpPr>
+            <a:spLocks noGrp="1"/>
+          </p:cNvSpPr>
+          <p:nvPr>
+            <p:ph type="title"/>
+          </p:nvPr>
+        </p:nvSpPr>
+        <p:spPr/>
+        <p:txBody>
+          <a:bodyPr/>
+          <a:lstStyle/>
+          <a:p>
+            <a:r>
+              <a:rPr lang="en-US" dirty="0"/>
               <a:t>XML</a:t>
             </a:r>
-            <a:endParaRPr lang="en-US" dirty="0"/>
           </a:p>
         </p:txBody>
       </p:sp>
@@ -3088,1435 +4312,6 @@
     <p:extLst>
       <p:ext uri="{BB962C8B-B14F-4D97-AF65-F5344CB8AC3E}">
         <p14:creationId xmlns:p14="http://schemas.microsoft.com/office/powerpoint/2010/main" val="1077025274"/>
-      </p:ext>
-    </p:extLst>
-  </p:cSld>
-  <p:clrMapOvr>
-    <a:masterClrMapping/>
-  </p:clrMapOvr>
-</p:sld>
-</file>
-
-<file path=ppt/slides/slide2.xml><?xml version="1.0" encoding="utf-8"?>
-<p:sld xmlns:a="http://schemas.openxmlformats.org/drawingml/2006/main" xmlns:r="http://schemas.openxmlformats.org/officeDocument/2006/relationships" xmlns:p="http://schemas.openxmlformats.org/presentationml/2006/main">
-  <p:cSld>
-    <p:spTree>
-      <p:nvGrpSpPr>
-        <p:cNvPr id="1" name=""/>
-        <p:cNvGrpSpPr/>
-        <p:nvPr/>
-      </p:nvGrpSpPr>
-      <p:grpSpPr>
-        <a:xfrm>
-          <a:off x="0" y="0"/>
-          <a:ext cx="0" cy="0"/>
-          <a:chOff x="0" y="0"/>
-          <a:chExt cx="0" cy="0"/>
-        </a:xfrm>
-      </p:grpSpPr>
-      <p:sp>
-        <p:nvSpPr>
-          <p:cNvPr id="4" name="Title 1"/>
-          <p:cNvSpPr>
-            <a:spLocks noGrp="1"/>
-          </p:cNvSpPr>
-          <p:nvPr>
-            <p:ph type="title"/>
-          </p:nvPr>
-        </p:nvSpPr>
-        <p:spPr/>
-        <p:txBody>
-          <a:bodyPr/>
-          <a:lstStyle/>
-          <a:p>
-            <a:r>
-              <a:rPr lang="en-US" dirty="0" smtClean="0"/>
-              <a:t>Plan – Think Before You Type</a:t>
-            </a:r>
-            <a:endParaRPr lang="en-US" dirty="0"/>
-          </a:p>
-        </p:txBody>
-      </p:sp>
-      <p:sp>
-        <p:nvSpPr>
-          <p:cNvPr id="5" name="Content Placeholder 2"/>
-          <p:cNvSpPr>
-            <a:spLocks noGrp="1"/>
-          </p:cNvSpPr>
-          <p:nvPr>
-            <p:ph idx="1"/>
-          </p:nvPr>
-        </p:nvSpPr>
-        <p:spPr/>
-        <p:txBody>
-          <a:bodyPr/>
-          <a:lstStyle/>
-          <a:p>
-            <a:r>
-              <a:rPr lang="en-US" dirty="0" smtClean="0"/>
-              <a:t>More important than:</a:t>
-            </a:r>
-          </a:p>
-          <a:p>
-            <a:pPr lvl="1"/>
-            <a:r>
-              <a:rPr lang="en-US" dirty="0" smtClean="0"/>
-              <a:t>Formulas</a:t>
-            </a:r>
-          </a:p>
-          <a:p>
-            <a:pPr lvl="1"/>
-            <a:r>
-              <a:rPr lang="en-US" dirty="0" smtClean="0"/>
-              <a:t>Which program you use</a:t>
-            </a:r>
-          </a:p>
-          <a:p>
-            <a:pPr lvl="1"/>
-            <a:r>
-              <a:rPr lang="en-US" dirty="0" smtClean="0"/>
-              <a:t>Fancy formatting</a:t>
-            </a:r>
-          </a:p>
-          <a:p>
-            <a:r>
-              <a:rPr lang="en-US" dirty="0" smtClean="0"/>
-              <a:t>Please, please, please, take the time to do this, even in a hectic situation.</a:t>
-            </a:r>
-          </a:p>
-        </p:txBody>
-      </p:sp>
-    </p:spTree>
-    <p:extLst>
-      <p:ext uri="{BB962C8B-B14F-4D97-AF65-F5344CB8AC3E}">
-        <p14:creationId xmlns:p14="http://schemas.microsoft.com/office/powerpoint/2010/main" val="2155030288"/>
-      </p:ext>
-    </p:extLst>
-  </p:cSld>
-  <p:clrMapOvr>
-    <a:masterClrMapping/>
-  </p:clrMapOvr>
-  <p:timing>
-    <p:tnLst>
-      <p:par>
-        <p:cTn id="1" dur="indefinite" restart="never" nodeType="tmRoot"/>
-      </p:par>
-    </p:tnLst>
-  </p:timing>
-</p:sld>
-</file>
-
-<file path=ppt/slides/slide3.xml><?xml version="1.0" encoding="utf-8"?>
-<p:sld xmlns:a="http://schemas.openxmlformats.org/drawingml/2006/main" xmlns:r="http://schemas.openxmlformats.org/officeDocument/2006/relationships" xmlns:p="http://schemas.openxmlformats.org/presentationml/2006/main">
-  <p:cSld>
-    <p:spTree>
-      <p:nvGrpSpPr>
-        <p:cNvPr id="1" name=""/>
-        <p:cNvGrpSpPr/>
-        <p:nvPr/>
-      </p:nvGrpSpPr>
-      <p:grpSpPr>
-        <a:xfrm>
-          <a:off x="0" y="0"/>
-          <a:ext cx="0" cy="0"/>
-          <a:chOff x="0" y="0"/>
-          <a:chExt cx="0" cy="0"/>
-        </a:xfrm>
-      </p:grpSpPr>
-      <p:sp>
-        <p:nvSpPr>
-          <p:cNvPr id="4" name="Title 1"/>
-          <p:cNvSpPr>
-            <a:spLocks noGrp="1"/>
-          </p:cNvSpPr>
-          <p:nvPr>
-            <p:ph type="title"/>
-          </p:nvPr>
-        </p:nvSpPr>
-        <p:spPr/>
-        <p:txBody>
-          <a:bodyPr/>
-          <a:lstStyle/>
-          <a:p>
-            <a:r>
-              <a:rPr lang="en-US" dirty="0" smtClean="0"/>
-              <a:t>Plan – Rows and Columns</a:t>
-            </a:r>
-            <a:endParaRPr lang="en-US" dirty="0"/>
-          </a:p>
-        </p:txBody>
-      </p:sp>
-      <p:sp>
-        <p:nvSpPr>
-          <p:cNvPr id="6" name="Content Placeholder 4"/>
-          <p:cNvSpPr>
-            <a:spLocks noGrp="1"/>
-          </p:cNvSpPr>
-          <p:nvPr>
-            <p:ph idx="1"/>
-          </p:nvPr>
-        </p:nvSpPr>
-        <p:spPr/>
-        <p:txBody>
-          <a:bodyPr/>
-          <a:lstStyle/>
-          <a:p>
-            <a:r>
-              <a:rPr lang="en-US" dirty="0" smtClean="0"/>
-              <a:t>Row – An observation or thing. Often a single record or a single form.</a:t>
-            </a:r>
-          </a:p>
-          <a:p>
-            <a:r>
-              <a:rPr lang="en-US" dirty="0" smtClean="0"/>
-              <a:t>Column – A </a:t>
-            </a:r>
-            <a:r>
-              <a:rPr lang="en-US" smtClean="0"/>
-              <a:t>specific type of </a:t>
-            </a:r>
-            <a:r>
-              <a:rPr lang="en-US" dirty="0" smtClean="0"/>
-              <a:t>information on/about a row. A field on a form.</a:t>
-            </a:r>
-          </a:p>
-          <a:p>
-            <a:r>
-              <a:rPr lang="en-US" dirty="0" smtClean="0"/>
-              <a:t>Rows and columns together make a table</a:t>
-            </a:r>
-          </a:p>
-        </p:txBody>
-      </p:sp>
-    </p:spTree>
-    <p:extLst>
-      <p:ext uri="{BB962C8B-B14F-4D97-AF65-F5344CB8AC3E}">
-        <p14:creationId xmlns:p14="http://schemas.microsoft.com/office/powerpoint/2010/main" val="3894115637"/>
-      </p:ext>
-    </p:extLst>
-  </p:cSld>
-  <p:clrMapOvr>
-    <a:masterClrMapping/>
-  </p:clrMapOvr>
-  <p:timing>
-    <p:tnLst>
-      <p:par>
-        <p:cTn id="1" dur="indefinite" restart="never" nodeType="tmRoot"/>
-      </p:par>
-    </p:tnLst>
-  </p:timing>
-</p:sld>
-</file>
-
-<file path=ppt/slides/slide4.xml><?xml version="1.0" encoding="utf-8"?>
-<p:sld xmlns:a="http://schemas.openxmlformats.org/drawingml/2006/main" xmlns:r="http://schemas.openxmlformats.org/officeDocument/2006/relationships" xmlns:p="http://schemas.openxmlformats.org/presentationml/2006/main">
-  <p:cSld>
-    <p:spTree>
-      <p:nvGrpSpPr>
-        <p:cNvPr id="1" name=""/>
-        <p:cNvGrpSpPr/>
-        <p:nvPr/>
-      </p:nvGrpSpPr>
-      <p:grpSpPr>
-        <a:xfrm>
-          <a:off x="0" y="0"/>
-          <a:ext cx="0" cy="0"/>
-          <a:chOff x="0" y="0"/>
-          <a:chExt cx="0" cy="0"/>
-        </a:xfrm>
-      </p:grpSpPr>
-      <p:sp>
-        <p:nvSpPr>
-          <p:cNvPr id="4" name="Title 1"/>
-          <p:cNvSpPr>
-            <a:spLocks noGrp="1"/>
-          </p:cNvSpPr>
-          <p:nvPr>
-            <p:ph type="title"/>
-          </p:nvPr>
-        </p:nvSpPr>
-        <p:spPr/>
-        <p:txBody>
-          <a:bodyPr/>
-          <a:lstStyle/>
-          <a:p>
-            <a:r>
-              <a:rPr lang="en-US" dirty="0" smtClean="0"/>
-              <a:t>Plan – Four Rules to </a:t>
-            </a:r>
-            <a:r>
-              <a:rPr lang="en-US" dirty="0"/>
-              <a:t>K</a:t>
-            </a:r>
-            <a:r>
-              <a:rPr lang="en-US" dirty="0" smtClean="0"/>
-              <a:t>eep </a:t>
-            </a:r>
-            <a:r>
-              <a:rPr lang="en-US" dirty="0"/>
-              <a:t>T</a:t>
-            </a:r>
-            <a:r>
-              <a:rPr lang="en-US" dirty="0" smtClean="0"/>
-              <a:t>ables Simple</a:t>
-            </a:r>
-            <a:endParaRPr lang="en-US" dirty="0"/>
-          </a:p>
-        </p:txBody>
-      </p:sp>
-      <p:sp>
-        <p:nvSpPr>
-          <p:cNvPr id="5" name="Content Placeholder 2"/>
-          <p:cNvSpPr>
-            <a:spLocks noGrp="1"/>
-          </p:cNvSpPr>
-          <p:nvPr>
-            <p:ph idx="1"/>
-          </p:nvPr>
-        </p:nvSpPr>
-        <p:spPr/>
-        <p:txBody>
-          <a:bodyPr/>
-          <a:lstStyle/>
-          <a:p>
-            <a:r>
-              <a:rPr lang="en-US" dirty="0" smtClean="0"/>
-              <a:t>One row per observation</a:t>
-            </a:r>
-          </a:p>
-          <a:p>
-            <a:r>
-              <a:rPr lang="en-US" dirty="0" smtClean="0"/>
-              <a:t>All rows in table contain the same type of observation</a:t>
-            </a:r>
-          </a:p>
-          <a:p>
-            <a:r>
-              <a:rPr lang="en-US" dirty="0" smtClean="0"/>
-              <a:t>Each cell only contains one piece of information</a:t>
-            </a:r>
-          </a:p>
-          <a:p>
-            <a:r>
-              <a:rPr lang="en-US" dirty="0"/>
-              <a:t>No duplicative columns (i.e. Date of First Contact, Date of Second Contact)</a:t>
-            </a:r>
-          </a:p>
-          <a:p>
-            <a:r>
-              <a:rPr lang="en-US" dirty="0" smtClean="0"/>
-              <a:t>But what if you think you need duplicative columns?</a:t>
-            </a:r>
-            <a:endParaRPr lang="en-US" dirty="0"/>
-          </a:p>
-        </p:txBody>
-      </p:sp>
-    </p:spTree>
-    <p:extLst>
-      <p:ext uri="{BB962C8B-B14F-4D97-AF65-F5344CB8AC3E}">
-        <p14:creationId xmlns:p14="http://schemas.microsoft.com/office/powerpoint/2010/main" val="2671365705"/>
-      </p:ext>
-    </p:extLst>
-  </p:cSld>
-  <p:clrMapOvr>
-    <a:masterClrMapping/>
-  </p:clrMapOvr>
-  <p:timing>
-    <p:tnLst>
-      <p:par>
-        <p:cTn id="1" dur="indefinite" restart="never" nodeType="tmRoot"/>
-      </p:par>
-    </p:tnLst>
-  </p:timing>
-</p:sld>
-</file>
-
-<file path=ppt/slides/slide5.xml><?xml version="1.0" encoding="utf-8"?>
-<p:sld xmlns:a="http://schemas.openxmlformats.org/drawingml/2006/main" xmlns:r="http://schemas.openxmlformats.org/officeDocument/2006/relationships" xmlns:p="http://schemas.openxmlformats.org/presentationml/2006/main">
-  <p:cSld>
-    <p:spTree>
-      <p:nvGrpSpPr>
-        <p:cNvPr id="1" name=""/>
-        <p:cNvGrpSpPr/>
-        <p:nvPr/>
-      </p:nvGrpSpPr>
-      <p:grpSpPr>
-        <a:xfrm>
-          <a:off x="0" y="0"/>
-          <a:ext cx="0" cy="0"/>
-          <a:chOff x="0" y="0"/>
-          <a:chExt cx="0" cy="0"/>
-        </a:xfrm>
-      </p:grpSpPr>
-      <p:sp>
-        <p:nvSpPr>
-          <p:cNvPr id="4" name="Title 1"/>
-          <p:cNvSpPr>
-            <a:spLocks noGrp="1"/>
-          </p:cNvSpPr>
-          <p:nvPr>
-            <p:ph type="title"/>
-          </p:nvPr>
-        </p:nvSpPr>
-        <p:spPr/>
-        <p:txBody>
-          <a:bodyPr>
-            <a:normAutofit/>
-          </a:bodyPr>
-          <a:lstStyle/>
-          <a:p>
-            <a:r>
-              <a:rPr lang="en-US" dirty="0" smtClean="0"/>
-              <a:t>Plan – When to Make a New Table for a New </a:t>
-            </a:r>
-            <a:r>
-              <a:rPr lang="en-US" dirty="0"/>
-              <a:t>I</a:t>
-            </a:r>
-            <a:r>
-              <a:rPr lang="en-US" dirty="0" smtClean="0"/>
-              <a:t>nformation </a:t>
-            </a:r>
-            <a:r>
-              <a:rPr lang="en-US" dirty="0"/>
-              <a:t>T</a:t>
-            </a:r>
-            <a:r>
-              <a:rPr lang="en-US" dirty="0" smtClean="0"/>
-              <a:t>ype </a:t>
-            </a:r>
-            <a:endParaRPr lang="en-US" dirty="0"/>
-          </a:p>
-        </p:txBody>
-      </p:sp>
-      <p:sp>
-        <p:nvSpPr>
-          <p:cNvPr id="5" name="Rounded Rectangle 4"/>
-          <p:cNvSpPr/>
-          <p:nvPr/>
-        </p:nvSpPr>
-        <p:spPr>
-          <a:xfrm>
-            <a:off x="4021493" y="2323061"/>
-            <a:ext cx="3763489" cy="1193961"/>
-          </a:xfrm>
-          <a:prstGeom prst="roundRect">
-            <a:avLst/>
-          </a:prstGeom>
-        </p:spPr>
-        <p:style>
-          <a:lnRef idx="2">
-            <a:schemeClr val="accent1">
-              <a:shade val="50000"/>
-            </a:schemeClr>
-          </a:lnRef>
-          <a:fillRef idx="1">
-            <a:schemeClr val="accent1"/>
-          </a:fillRef>
-          <a:effectRef idx="0">
-            <a:schemeClr val="accent1"/>
-          </a:effectRef>
-          <a:fontRef idx="minor">
-            <a:schemeClr val="lt1"/>
-          </a:fontRef>
-        </p:style>
-        <p:txBody>
-          <a:bodyPr rtlCol="0" anchor="ctr"/>
-          <a:lstStyle/>
-          <a:p>
-            <a:pPr algn="ctr"/>
-            <a:r>
-              <a:rPr lang="en-US" dirty="0" smtClean="0"/>
-              <a:t>Can a Victim Have More Than One? (i.e. more than one hospital form, more than one NOK phone number, more than one date of birth)</a:t>
-            </a:r>
-            <a:endParaRPr lang="en-US" dirty="0"/>
-          </a:p>
-        </p:txBody>
-      </p:sp>
-      <p:sp>
-        <p:nvSpPr>
-          <p:cNvPr id="6" name="Down Arrow 5"/>
-          <p:cNvSpPr/>
-          <p:nvPr/>
-        </p:nvSpPr>
-        <p:spPr>
-          <a:xfrm rot="2081282">
-            <a:off x="4336756" y="3529153"/>
-            <a:ext cx="775125" cy="1349997"/>
-          </a:xfrm>
-          <a:prstGeom prst="downArrow">
-            <a:avLst/>
-          </a:prstGeom>
-        </p:spPr>
-        <p:style>
-          <a:lnRef idx="2">
-            <a:schemeClr val="accent1">
-              <a:shade val="50000"/>
-            </a:schemeClr>
-          </a:lnRef>
-          <a:fillRef idx="1">
-            <a:schemeClr val="accent1"/>
-          </a:fillRef>
-          <a:effectRef idx="0">
-            <a:schemeClr val="accent1"/>
-          </a:effectRef>
-          <a:fontRef idx="minor">
-            <a:schemeClr val="lt1"/>
-          </a:fontRef>
-        </p:style>
-        <p:txBody>
-          <a:bodyPr rtlCol="0" anchor="ctr"/>
-          <a:lstStyle/>
-          <a:p>
-            <a:pPr algn="ctr"/>
-            <a:r>
-              <a:rPr lang="en-US" dirty="0" smtClean="0"/>
-              <a:t>Ye</a:t>
-            </a:r>
-          </a:p>
-          <a:p>
-            <a:pPr algn="ctr"/>
-            <a:r>
-              <a:rPr lang="en-US" dirty="0"/>
-              <a:t>s</a:t>
-            </a:r>
-          </a:p>
-        </p:txBody>
-      </p:sp>
-      <p:sp>
-        <p:nvSpPr>
-          <p:cNvPr id="7" name="Down Arrow 6"/>
-          <p:cNvSpPr/>
-          <p:nvPr/>
-        </p:nvSpPr>
-        <p:spPr>
-          <a:xfrm rot="19447084">
-            <a:off x="6600552" y="3530686"/>
-            <a:ext cx="775125" cy="1349997"/>
-          </a:xfrm>
-          <a:prstGeom prst="downArrow">
-            <a:avLst/>
-          </a:prstGeom>
-        </p:spPr>
-        <p:style>
-          <a:lnRef idx="2">
-            <a:schemeClr val="accent1">
-              <a:shade val="50000"/>
-            </a:schemeClr>
-          </a:lnRef>
-          <a:fillRef idx="1">
-            <a:schemeClr val="accent1"/>
-          </a:fillRef>
-          <a:effectRef idx="0">
-            <a:schemeClr val="accent1"/>
-          </a:effectRef>
-          <a:fontRef idx="minor">
-            <a:schemeClr val="lt1"/>
-          </a:fontRef>
-        </p:style>
-        <p:txBody>
-          <a:bodyPr rtlCol="0" anchor="ctr"/>
-          <a:lstStyle/>
-          <a:p>
-            <a:pPr algn="ctr"/>
-            <a:r>
-              <a:rPr lang="en-US" dirty="0" smtClean="0"/>
-              <a:t>N</a:t>
-            </a:r>
-          </a:p>
-          <a:p>
-            <a:pPr algn="ctr"/>
-            <a:r>
-              <a:rPr lang="en-US" dirty="0"/>
-              <a:t>o</a:t>
-            </a:r>
-          </a:p>
-        </p:txBody>
-      </p:sp>
-      <p:sp>
-        <p:nvSpPr>
-          <p:cNvPr id="8" name="Rounded Rectangle 7"/>
-          <p:cNvSpPr/>
-          <p:nvPr/>
-        </p:nvSpPr>
-        <p:spPr>
-          <a:xfrm>
-            <a:off x="3104579" y="4976675"/>
-            <a:ext cx="2219163" cy="793102"/>
-          </a:xfrm>
-          <a:prstGeom prst="roundRect">
-            <a:avLst/>
-          </a:prstGeom>
-        </p:spPr>
-        <p:style>
-          <a:lnRef idx="2">
-            <a:schemeClr val="accent1">
-              <a:shade val="50000"/>
-            </a:schemeClr>
-          </a:lnRef>
-          <a:fillRef idx="1">
-            <a:schemeClr val="accent1"/>
-          </a:fillRef>
-          <a:effectRef idx="0">
-            <a:schemeClr val="accent1"/>
-          </a:effectRef>
-          <a:fontRef idx="minor">
-            <a:schemeClr val="lt1"/>
-          </a:fontRef>
-        </p:style>
-        <p:txBody>
-          <a:bodyPr rtlCol="0" anchor="ctr"/>
-          <a:lstStyle/>
-          <a:p>
-            <a:pPr algn="ctr"/>
-            <a:r>
-              <a:rPr lang="en-US" dirty="0" smtClean="0"/>
-              <a:t>Make a new table</a:t>
-            </a:r>
-            <a:endParaRPr lang="en-US" dirty="0"/>
-          </a:p>
-        </p:txBody>
-      </p:sp>
-      <p:sp>
-        <p:nvSpPr>
-          <p:cNvPr id="9" name="Rounded Rectangle 8"/>
-          <p:cNvSpPr/>
-          <p:nvPr/>
-        </p:nvSpPr>
-        <p:spPr>
-          <a:xfrm>
-            <a:off x="6588173" y="4979741"/>
-            <a:ext cx="2219163" cy="793102"/>
-          </a:xfrm>
-          <a:prstGeom prst="roundRect">
-            <a:avLst/>
-          </a:prstGeom>
-        </p:spPr>
-        <p:style>
-          <a:lnRef idx="2">
-            <a:schemeClr val="accent1">
-              <a:shade val="50000"/>
-            </a:schemeClr>
-          </a:lnRef>
-          <a:fillRef idx="1">
-            <a:schemeClr val="accent1"/>
-          </a:fillRef>
-          <a:effectRef idx="0">
-            <a:schemeClr val="accent1"/>
-          </a:effectRef>
-          <a:fontRef idx="minor">
-            <a:schemeClr val="lt1"/>
-          </a:fontRef>
-        </p:style>
-        <p:txBody>
-          <a:bodyPr rtlCol="0" anchor="ctr"/>
-          <a:lstStyle/>
-          <a:p>
-            <a:pPr algn="ctr"/>
-            <a:r>
-              <a:rPr lang="en-US" dirty="0" smtClean="0"/>
-              <a:t>Make new column(s) in the main table or make a new table</a:t>
-            </a:r>
-            <a:endParaRPr lang="en-US" dirty="0"/>
-          </a:p>
-        </p:txBody>
-      </p:sp>
-    </p:spTree>
-    <p:extLst>
-      <p:ext uri="{BB962C8B-B14F-4D97-AF65-F5344CB8AC3E}">
-        <p14:creationId xmlns:p14="http://schemas.microsoft.com/office/powerpoint/2010/main" val="3646340457"/>
-      </p:ext>
-    </p:extLst>
-  </p:cSld>
-  <p:clrMapOvr>
-    <a:masterClrMapping/>
-  </p:clrMapOvr>
-  <p:timing>
-    <p:tnLst>
-      <p:par>
-        <p:cTn id="1" dur="indefinite" restart="never" nodeType="tmRoot"/>
-      </p:par>
-    </p:tnLst>
-  </p:timing>
-</p:sld>
-</file>
-
-<file path=ppt/slides/slide6.xml><?xml version="1.0" encoding="utf-8"?>
-<p:sld xmlns:a="http://schemas.openxmlformats.org/drawingml/2006/main" xmlns:r="http://schemas.openxmlformats.org/officeDocument/2006/relationships" xmlns:p="http://schemas.openxmlformats.org/presentationml/2006/main">
-  <p:cSld>
-    <p:spTree>
-      <p:nvGrpSpPr>
-        <p:cNvPr id="1" name=""/>
-        <p:cNvGrpSpPr/>
-        <p:nvPr/>
-      </p:nvGrpSpPr>
-      <p:grpSpPr>
-        <a:xfrm>
-          <a:off x="0" y="0"/>
-          <a:ext cx="0" cy="0"/>
-          <a:chOff x="0" y="0"/>
-          <a:chExt cx="0" cy="0"/>
-        </a:xfrm>
-      </p:grpSpPr>
-      <p:sp>
-        <p:nvSpPr>
-          <p:cNvPr id="4" name="Title 1"/>
-          <p:cNvSpPr>
-            <a:spLocks noGrp="1"/>
-          </p:cNvSpPr>
-          <p:nvPr>
-            <p:ph type="title"/>
-          </p:nvPr>
-        </p:nvSpPr>
-        <p:spPr/>
-        <p:txBody>
-          <a:bodyPr/>
-          <a:lstStyle/>
-          <a:p>
-            <a:r>
-              <a:rPr lang="en-US" dirty="0" smtClean="0"/>
-              <a:t>Plan – Keys</a:t>
-            </a:r>
-            <a:endParaRPr lang="en-US" dirty="0"/>
-          </a:p>
-        </p:txBody>
-      </p:sp>
-      <p:sp>
-        <p:nvSpPr>
-          <p:cNvPr id="5" name="Content Placeholder 2"/>
-          <p:cNvSpPr>
-            <a:spLocks noGrp="1"/>
-          </p:cNvSpPr>
-          <p:nvPr>
-            <p:ph idx="1"/>
-          </p:nvPr>
-        </p:nvSpPr>
-        <p:spPr>
-          <a:xfrm>
-            <a:off x="1141412" y="2249487"/>
-            <a:ext cx="9905999" cy="3541714"/>
-          </a:xfrm>
-        </p:spPr>
-        <p:txBody>
-          <a:bodyPr/>
-          <a:lstStyle/>
-          <a:p>
-            <a:r>
-              <a:rPr lang="en-US" dirty="0" smtClean="0"/>
-              <a:t>If you have multiple tables, you must link them using unique ID numbers</a:t>
-            </a:r>
-          </a:p>
-          <a:p>
-            <a:r>
-              <a:rPr lang="en-US" dirty="0" smtClean="0"/>
-              <a:t>Even if you have one table, having an ID number is a good idea</a:t>
-            </a:r>
-          </a:p>
-        </p:txBody>
-      </p:sp>
-    </p:spTree>
-    <p:extLst>
-      <p:ext uri="{BB962C8B-B14F-4D97-AF65-F5344CB8AC3E}">
-        <p14:creationId xmlns:p14="http://schemas.microsoft.com/office/powerpoint/2010/main" val="1856329535"/>
-      </p:ext>
-    </p:extLst>
-  </p:cSld>
-  <p:clrMapOvr>
-    <a:masterClrMapping/>
-  </p:clrMapOvr>
-  <p:timing>
-    <p:tnLst>
-      <p:par>
-        <p:cTn id="1" dur="indefinite" restart="never" nodeType="tmRoot"/>
-      </p:par>
-    </p:tnLst>
-  </p:timing>
-</p:sld>
-</file>
-
-<file path=ppt/slides/slide7.xml><?xml version="1.0" encoding="utf-8"?>
-<p:sld xmlns:a="http://schemas.openxmlformats.org/drawingml/2006/main" xmlns:r="http://schemas.openxmlformats.org/officeDocument/2006/relationships" xmlns:p="http://schemas.openxmlformats.org/presentationml/2006/main">
-  <p:cSld>
-    <p:spTree>
-      <p:nvGrpSpPr>
-        <p:cNvPr id="1" name=""/>
-        <p:cNvGrpSpPr/>
-        <p:nvPr/>
-      </p:nvGrpSpPr>
-      <p:grpSpPr>
-        <a:xfrm>
-          <a:off x="0" y="0"/>
-          <a:ext cx="0" cy="0"/>
-          <a:chOff x="0" y="0"/>
-          <a:chExt cx="0" cy="0"/>
-        </a:xfrm>
-      </p:grpSpPr>
-      <p:sp>
-        <p:nvSpPr>
-          <p:cNvPr id="2" name="Title 1"/>
-          <p:cNvSpPr>
-            <a:spLocks noGrp="1"/>
-          </p:cNvSpPr>
-          <p:nvPr>
-            <p:ph type="title"/>
-          </p:nvPr>
-        </p:nvSpPr>
-        <p:spPr/>
-        <p:txBody>
-          <a:bodyPr/>
-          <a:lstStyle/>
-          <a:p>
-            <a:r>
-              <a:rPr lang="en-US" dirty="0" smtClean="0"/>
-              <a:t>Tabular Data Formats</a:t>
-            </a:r>
-            <a:endParaRPr lang="en-US" dirty="0"/>
-          </a:p>
-        </p:txBody>
-      </p:sp>
-      <p:sp>
-        <p:nvSpPr>
-          <p:cNvPr id="3" name="Content Placeholder 2"/>
-          <p:cNvSpPr>
-            <a:spLocks noGrp="1"/>
-          </p:cNvSpPr>
-          <p:nvPr>
-            <p:ph idx="1"/>
-          </p:nvPr>
-        </p:nvSpPr>
-        <p:spPr/>
-        <p:txBody>
-          <a:bodyPr/>
-          <a:lstStyle/>
-          <a:p>
-            <a:r>
-              <a:rPr lang="en-US" dirty="0" smtClean="0"/>
-              <a:t>CSV</a:t>
-            </a:r>
-          </a:p>
-          <a:p>
-            <a:r>
-              <a:rPr lang="en-US" dirty="0" smtClean="0"/>
-              <a:t>Excel</a:t>
-            </a:r>
-          </a:p>
-          <a:p>
-            <a:r>
-              <a:rPr lang="en-US" dirty="0" smtClean="0"/>
-              <a:t>Access</a:t>
-            </a:r>
-            <a:endParaRPr lang="en-US" dirty="0"/>
-          </a:p>
-        </p:txBody>
-      </p:sp>
-    </p:spTree>
-    <p:extLst>
-      <p:ext uri="{BB962C8B-B14F-4D97-AF65-F5344CB8AC3E}">
-        <p14:creationId xmlns:p14="http://schemas.microsoft.com/office/powerpoint/2010/main" val="2352723395"/>
-      </p:ext>
-    </p:extLst>
-  </p:cSld>
-  <p:clrMapOvr>
-    <a:masterClrMapping/>
-  </p:clrMapOvr>
-</p:sld>
-</file>
-
-<file path=ppt/slides/slide8.xml><?xml version="1.0" encoding="utf-8"?>
-<p:sld xmlns:a="http://schemas.openxmlformats.org/drawingml/2006/main" xmlns:r="http://schemas.openxmlformats.org/officeDocument/2006/relationships" xmlns:p="http://schemas.openxmlformats.org/presentationml/2006/main">
-  <p:cSld>
-    <p:spTree>
-      <p:nvGrpSpPr>
-        <p:cNvPr id="1" name=""/>
-        <p:cNvGrpSpPr/>
-        <p:nvPr/>
-      </p:nvGrpSpPr>
-      <p:grpSpPr>
-        <a:xfrm>
-          <a:off x="0" y="0"/>
-          <a:ext cx="0" cy="0"/>
-          <a:chOff x="0" y="0"/>
-          <a:chExt cx="0" cy="0"/>
-        </a:xfrm>
-      </p:grpSpPr>
-      <p:sp>
-        <p:nvSpPr>
-          <p:cNvPr id="2" name="Title 1"/>
-          <p:cNvSpPr>
-            <a:spLocks noGrp="1"/>
-          </p:cNvSpPr>
-          <p:nvPr>
-            <p:ph type="title"/>
-          </p:nvPr>
-        </p:nvSpPr>
-        <p:spPr/>
-        <p:txBody>
-          <a:bodyPr/>
-          <a:lstStyle/>
-          <a:p>
-            <a:r>
-              <a:rPr lang="en-US" dirty="0" smtClean="0"/>
-              <a:t>Non-Tabular Data Formats</a:t>
-            </a:r>
-            <a:endParaRPr lang="en-US" dirty="0"/>
-          </a:p>
-        </p:txBody>
-      </p:sp>
-      <p:sp>
-        <p:nvSpPr>
-          <p:cNvPr id="3" name="Content Placeholder 2"/>
-          <p:cNvSpPr>
-            <a:spLocks noGrp="1"/>
-          </p:cNvSpPr>
-          <p:nvPr>
-            <p:ph idx="1"/>
-          </p:nvPr>
-        </p:nvSpPr>
-        <p:spPr/>
-        <p:txBody>
-          <a:bodyPr/>
-          <a:lstStyle/>
-          <a:p>
-            <a:r>
-              <a:rPr lang="en-US" dirty="0" smtClean="0"/>
-              <a:t>JSON</a:t>
-            </a:r>
-          </a:p>
-          <a:p>
-            <a:r>
-              <a:rPr lang="en-US" dirty="0" smtClean="0"/>
-              <a:t>HTML/XML</a:t>
-            </a:r>
-          </a:p>
-          <a:p>
-            <a:r>
-              <a:rPr lang="en-US" dirty="0" smtClean="0"/>
-              <a:t>Raw text</a:t>
-            </a:r>
-            <a:endParaRPr lang="en-US" dirty="0"/>
-          </a:p>
-        </p:txBody>
-      </p:sp>
-    </p:spTree>
-    <p:extLst>
-      <p:ext uri="{BB962C8B-B14F-4D97-AF65-F5344CB8AC3E}">
-        <p14:creationId xmlns:p14="http://schemas.microsoft.com/office/powerpoint/2010/main" val="1739692630"/>
-      </p:ext>
-    </p:extLst>
-  </p:cSld>
-  <p:clrMapOvr>
-    <a:masterClrMapping/>
-  </p:clrMapOvr>
-</p:sld>
-</file>
-
-<file path=ppt/slides/slide9.xml><?xml version="1.0" encoding="utf-8"?>
-<p:sld xmlns:a="http://schemas.openxmlformats.org/drawingml/2006/main" xmlns:r="http://schemas.openxmlformats.org/officeDocument/2006/relationships" xmlns:p="http://schemas.openxmlformats.org/presentationml/2006/main">
-  <p:cSld>
-    <p:spTree>
-      <p:nvGrpSpPr>
-        <p:cNvPr id="1" name=""/>
-        <p:cNvGrpSpPr/>
-        <p:nvPr/>
-      </p:nvGrpSpPr>
-      <p:grpSpPr>
-        <a:xfrm>
-          <a:off x="0" y="0"/>
-          <a:ext cx="0" cy="0"/>
-          <a:chOff x="0" y="0"/>
-          <a:chExt cx="0" cy="0"/>
-        </a:xfrm>
-      </p:grpSpPr>
-      <p:sp>
-        <p:nvSpPr>
-          <p:cNvPr id="2" name="Title 1"/>
-          <p:cNvSpPr>
-            <a:spLocks noGrp="1"/>
-          </p:cNvSpPr>
-          <p:nvPr>
-            <p:ph type="title"/>
-          </p:nvPr>
-        </p:nvSpPr>
-        <p:spPr/>
-        <p:txBody>
-          <a:bodyPr/>
-          <a:lstStyle/>
-          <a:p>
-            <a:r>
-              <a:rPr lang="en-US" dirty="0" smtClean="0"/>
-              <a:t>JSON</a:t>
-            </a:r>
-            <a:endParaRPr lang="en-US" dirty="0"/>
-          </a:p>
-        </p:txBody>
-      </p:sp>
-      <p:sp>
-        <p:nvSpPr>
-          <p:cNvPr id="5" name="Rectangle 4"/>
-          <p:cNvSpPr/>
-          <p:nvPr/>
-        </p:nvSpPr>
-        <p:spPr>
-          <a:xfrm>
-            <a:off x="4802659" y="365125"/>
-            <a:ext cx="6096000" cy="6285439"/>
-          </a:xfrm>
-          <a:prstGeom prst="rect">
-            <a:avLst/>
-          </a:prstGeom>
-        </p:spPr>
-        <p:txBody>
-          <a:bodyPr>
-            <a:spAutoFit/>
-          </a:bodyPr>
-          <a:lstStyle/>
-          <a:p>
-            <a:pPr>
-              <a:lnSpc>
-                <a:spcPct val="107000"/>
-              </a:lnSpc>
-              <a:spcAft>
-                <a:spcPts val="800"/>
-              </a:spcAft>
-            </a:pPr>
-            <a:r>
-              <a:rPr lang="en-US" sz="1200" dirty="0" smtClean="0">
-                <a:effectLst/>
-                <a:latin typeface="Calibri" panose="020F0502020204030204" pitchFamily="34" charset="0"/>
-                <a:ea typeface="Calibri" panose="020F0502020204030204" pitchFamily="34" charset="0"/>
-                <a:cs typeface="Arial" panose="020B0604020202020204" pitchFamily="34" charset="0"/>
-              </a:rPr>
-              <a:t>{</a:t>
-            </a:r>
-          </a:p>
-          <a:p>
-            <a:pPr>
-              <a:lnSpc>
-                <a:spcPct val="107000"/>
-              </a:lnSpc>
-              <a:spcAft>
-                <a:spcPts val="800"/>
-              </a:spcAft>
-            </a:pPr>
-            <a:r>
-              <a:rPr lang="en-US" sz="1200" dirty="0" smtClean="0">
-                <a:effectLst/>
-                <a:latin typeface="Calibri" panose="020F0502020204030204" pitchFamily="34" charset="0"/>
-                <a:ea typeface="Calibri" panose="020F0502020204030204" pitchFamily="34" charset="0"/>
-                <a:cs typeface="Arial" panose="020B0604020202020204" pitchFamily="34" charset="0"/>
-              </a:rPr>
-              <a:t>  "colors": [</a:t>
-            </a:r>
-          </a:p>
-          <a:p>
-            <a:pPr>
-              <a:lnSpc>
-                <a:spcPct val="107000"/>
-              </a:lnSpc>
-              <a:spcAft>
-                <a:spcPts val="800"/>
-              </a:spcAft>
-            </a:pPr>
-            <a:r>
-              <a:rPr lang="en-US" sz="1200" dirty="0" smtClean="0">
-                <a:effectLst/>
-                <a:latin typeface="Calibri" panose="020F0502020204030204" pitchFamily="34" charset="0"/>
-                <a:ea typeface="Calibri" panose="020F0502020204030204" pitchFamily="34" charset="0"/>
-                <a:cs typeface="Arial" panose="020B0604020202020204" pitchFamily="34" charset="0"/>
-              </a:rPr>
-              <a:t>    {</a:t>
-            </a:r>
-          </a:p>
-          <a:p>
-            <a:pPr>
-              <a:lnSpc>
-                <a:spcPct val="107000"/>
-              </a:lnSpc>
-              <a:spcAft>
-                <a:spcPts val="800"/>
-              </a:spcAft>
-            </a:pPr>
-            <a:r>
-              <a:rPr lang="en-US" sz="1200" dirty="0" smtClean="0">
-                <a:effectLst/>
-                <a:latin typeface="Calibri" panose="020F0502020204030204" pitchFamily="34" charset="0"/>
-                <a:ea typeface="Calibri" panose="020F0502020204030204" pitchFamily="34" charset="0"/>
-                <a:cs typeface="Arial" panose="020B0604020202020204" pitchFamily="34" charset="0"/>
-              </a:rPr>
-              <a:t>      "color": "black",</a:t>
-            </a:r>
-          </a:p>
-          <a:p>
-            <a:pPr>
-              <a:lnSpc>
-                <a:spcPct val="107000"/>
-              </a:lnSpc>
-              <a:spcAft>
-                <a:spcPts val="800"/>
-              </a:spcAft>
-            </a:pPr>
-            <a:r>
-              <a:rPr lang="en-US" sz="1200" dirty="0" smtClean="0">
-                <a:effectLst/>
-                <a:latin typeface="Calibri" panose="020F0502020204030204" pitchFamily="34" charset="0"/>
-                <a:ea typeface="Calibri" panose="020F0502020204030204" pitchFamily="34" charset="0"/>
-                <a:cs typeface="Arial" panose="020B0604020202020204" pitchFamily="34" charset="0"/>
-              </a:rPr>
-              <a:t>      "category": "hue",</a:t>
-            </a:r>
-          </a:p>
-          <a:p>
-            <a:pPr>
-              <a:lnSpc>
-                <a:spcPct val="107000"/>
-              </a:lnSpc>
-              <a:spcAft>
-                <a:spcPts val="800"/>
-              </a:spcAft>
-            </a:pPr>
-            <a:r>
-              <a:rPr lang="en-US" sz="1200" dirty="0" smtClean="0">
-                <a:effectLst/>
-                <a:latin typeface="Calibri" panose="020F0502020204030204" pitchFamily="34" charset="0"/>
-                <a:ea typeface="Calibri" panose="020F0502020204030204" pitchFamily="34" charset="0"/>
-                <a:cs typeface="Arial" panose="020B0604020202020204" pitchFamily="34" charset="0"/>
-              </a:rPr>
-              <a:t>      "type": "primary",</a:t>
-            </a:r>
-          </a:p>
-          <a:p>
-            <a:pPr>
-              <a:lnSpc>
-                <a:spcPct val="107000"/>
-              </a:lnSpc>
-              <a:spcAft>
-                <a:spcPts val="800"/>
-              </a:spcAft>
-            </a:pPr>
-            <a:r>
-              <a:rPr lang="en-US" sz="1200" dirty="0" smtClean="0">
-                <a:effectLst/>
-                <a:latin typeface="Calibri" panose="020F0502020204030204" pitchFamily="34" charset="0"/>
-                <a:ea typeface="Calibri" panose="020F0502020204030204" pitchFamily="34" charset="0"/>
-                <a:cs typeface="Arial" panose="020B0604020202020204" pitchFamily="34" charset="0"/>
-              </a:rPr>
-              <a:t>      "code": {</a:t>
-            </a:r>
-          </a:p>
-          <a:p>
-            <a:pPr>
-              <a:lnSpc>
-                <a:spcPct val="107000"/>
-              </a:lnSpc>
-              <a:spcAft>
-                <a:spcPts val="800"/>
-              </a:spcAft>
-            </a:pPr>
-            <a:r>
-              <a:rPr lang="en-US" sz="1200" dirty="0" smtClean="0">
-                <a:effectLst/>
-                <a:latin typeface="Calibri" panose="020F0502020204030204" pitchFamily="34" charset="0"/>
-                <a:ea typeface="Calibri" panose="020F0502020204030204" pitchFamily="34" charset="0"/>
-                <a:cs typeface="Arial" panose="020B0604020202020204" pitchFamily="34" charset="0"/>
-              </a:rPr>
-              <a:t>        "</a:t>
-            </a:r>
-            <a:r>
-              <a:rPr lang="en-US" sz="1200" dirty="0" err="1" smtClean="0">
-                <a:effectLst/>
-                <a:latin typeface="Calibri" panose="020F0502020204030204" pitchFamily="34" charset="0"/>
-                <a:ea typeface="Calibri" panose="020F0502020204030204" pitchFamily="34" charset="0"/>
-                <a:cs typeface="Arial" panose="020B0604020202020204" pitchFamily="34" charset="0"/>
-              </a:rPr>
-              <a:t>rgba</a:t>
-            </a:r>
-            <a:r>
-              <a:rPr lang="en-US" sz="1200" dirty="0" smtClean="0">
-                <a:effectLst/>
-                <a:latin typeface="Calibri" panose="020F0502020204030204" pitchFamily="34" charset="0"/>
-                <a:ea typeface="Calibri" panose="020F0502020204030204" pitchFamily="34" charset="0"/>
-                <a:cs typeface="Arial" panose="020B0604020202020204" pitchFamily="34" charset="0"/>
-              </a:rPr>
-              <a:t>": [255,255,255,1],</a:t>
-            </a:r>
-          </a:p>
-          <a:p>
-            <a:pPr>
-              <a:lnSpc>
-                <a:spcPct val="107000"/>
-              </a:lnSpc>
-              <a:spcAft>
-                <a:spcPts val="800"/>
-              </a:spcAft>
-            </a:pPr>
-            <a:r>
-              <a:rPr lang="en-US" sz="1200" dirty="0" smtClean="0">
-                <a:effectLst/>
-                <a:latin typeface="Calibri" panose="020F0502020204030204" pitchFamily="34" charset="0"/>
-                <a:ea typeface="Calibri" panose="020F0502020204030204" pitchFamily="34" charset="0"/>
-                <a:cs typeface="Arial" panose="020B0604020202020204" pitchFamily="34" charset="0"/>
-              </a:rPr>
-              <a:t>        "hex": "#000"</a:t>
-            </a:r>
-          </a:p>
-          <a:p>
-            <a:pPr>
-              <a:lnSpc>
-                <a:spcPct val="107000"/>
-              </a:lnSpc>
-              <a:spcAft>
-                <a:spcPts val="800"/>
-              </a:spcAft>
-            </a:pPr>
-            <a:r>
-              <a:rPr lang="en-US" sz="1200" dirty="0" smtClean="0">
-                <a:effectLst/>
-                <a:latin typeface="Calibri" panose="020F0502020204030204" pitchFamily="34" charset="0"/>
-                <a:ea typeface="Calibri" panose="020F0502020204030204" pitchFamily="34" charset="0"/>
-                <a:cs typeface="Arial" panose="020B0604020202020204" pitchFamily="34" charset="0"/>
-              </a:rPr>
-              <a:t>      }</a:t>
-            </a:r>
-          </a:p>
-          <a:p>
-            <a:pPr>
-              <a:lnSpc>
-                <a:spcPct val="107000"/>
-              </a:lnSpc>
-              <a:spcAft>
-                <a:spcPts val="800"/>
-              </a:spcAft>
-            </a:pPr>
-            <a:r>
-              <a:rPr lang="en-US" sz="1200" dirty="0" smtClean="0">
-                <a:effectLst/>
-                <a:latin typeface="Calibri" panose="020F0502020204030204" pitchFamily="34" charset="0"/>
-                <a:ea typeface="Calibri" panose="020F0502020204030204" pitchFamily="34" charset="0"/>
-                <a:cs typeface="Arial" panose="020B0604020202020204" pitchFamily="34" charset="0"/>
-              </a:rPr>
-              <a:t>    },</a:t>
-            </a:r>
-          </a:p>
-          <a:p>
-            <a:pPr>
-              <a:lnSpc>
-                <a:spcPct val="107000"/>
-              </a:lnSpc>
-              <a:spcAft>
-                <a:spcPts val="800"/>
-              </a:spcAft>
-            </a:pPr>
-            <a:r>
-              <a:rPr lang="en-US" sz="1200" dirty="0" smtClean="0">
-                <a:effectLst/>
-                <a:latin typeface="Calibri" panose="020F0502020204030204" pitchFamily="34" charset="0"/>
-                <a:ea typeface="Calibri" panose="020F0502020204030204" pitchFamily="34" charset="0"/>
-                <a:cs typeface="Arial" panose="020B0604020202020204" pitchFamily="34" charset="0"/>
-              </a:rPr>
-              <a:t>    {</a:t>
-            </a:r>
-          </a:p>
-          <a:p>
-            <a:pPr>
-              <a:lnSpc>
-                <a:spcPct val="107000"/>
-              </a:lnSpc>
-              <a:spcAft>
-                <a:spcPts val="800"/>
-              </a:spcAft>
-            </a:pPr>
-            <a:r>
-              <a:rPr lang="en-US" sz="1200" dirty="0" smtClean="0">
-                <a:effectLst/>
-                <a:latin typeface="Calibri" panose="020F0502020204030204" pitchFamily="34" charset="0"/>
-                <a:ea typeface="Calibri" panose="020F0502020204030204" pitchFamily="34" charset="0"/>
-                <a:cs typeface="Arial" panose="020B0604020202020204" pitchFamily="34" charset="0"/>
-              </a:rPr>
-              <a:t>      "color": "white",</a:t>
-            </a:r>
-          </a:p>
-          <a:p>
-            <a:pPr>
-              <a:lnSpc>
-                <a:spcPct val="107000"/>
-              </a:lnSpc>
-              <a:spcAft>
-                <a:spcPts val="800"/>
-              </a:spcAft>
-            </a:pPr>
-            <a:r>
-              <a:rPr lang="en-US" sz="1200" dirty="0" smtClean="0">
-                <a:effectLst/>
-                <a:latin typeface="Calibri" panose="020F0502020204030204" pitchFamily="34" charset="0"/>
-                <a:ea typeface="Calibri" panose="020F0502020204030204" pitchFamily="34" charset="0"/>
-                <a:cs typeface="Arial" panose="020B0604020202020204" pitchFamily="34" charset="0"/>
-              </a:rPr>
-              <a:t>      "category": "value",</a:t>
-            </a:r>
-          </a:p>
-          <a:p>
-            <a:pPr>
-              <a:lnSpc>
-                <a:spcPct val="107000"/>
-              </a:lnSpc>
-              <a:spcAft>
-                <a:spcPts val="800"/>
-              </a:spcAft>
-            </a:pPr>
-            <a:r>
-              <a:rPr lang="en-US" sz="1200" dirty="0" smtClean="0">
-                <a:effectLst/>
-                <a:latin typeface="Calibri" panose="020F0502020204030204" pitchFamily="34" charset="0"/>
-                <a:ea typeface="Calibri" panose="020F0502020204030204" pitchFamily="34" charset="0"/>
-                <a:cs typeface="Arial" panose="020B0604020202020204" pitchFamily="34" charset="0"/>
-              </a:rPr>
-              <a:t>      "code": {</a:t>
-            </a:r>
-          </a:p>
-          <a:p>
-            <a:pPr>
-              <a:lnSpc>
-                <a:spcPct val="107000"/>
-              </a:lnSpc>
-              <a:spcAft>
-                <a:spcPts val="800"/>
-              </a:spcAft>
-            </a:pPr>
-            <a:r>
-              <a:rPr lang="en-US" sz="1200" dirty="0" smtClean="0">
-                <a:effectLst/>
-                <a:latin typeface="Calibri" panose="020F0502020204030204" pitchFamily="34" charset="0"/>
-                <a:ea typeface="Calibri" panose="020F0502020204030204" pitchFamily="34" charset="0"/>
-                <a:cs typeface="Arial" panose="020B0604020202020204" pitchFamily="34" charset="0"/>
-              </a:rPr>
-              <a:t>        "</a:t>
-            </a:r>
-            <a:r>
-              <a:rPr lang="en-US" sz="1200" dirty="0" err="1" smtClean="0">
-                <a:effectLst/>
-                <a:latin typeface="Calibri" panose="020F0502020204030204" pitchFamily="34" charset="0"/>
-                <a:ea typeface="Calibri" panose="020F0502020204030204" pitchFamily="34" charset="0"/>
-                <a:cs typeface="Arial" panose="020B0604020202020204" pitchFamily="34" charset="0"/>
-              </a:rPr>
-              <a:t>rgba</a:t>
-            </a:r>
-            <a:r>
-              <a:rPr lang="en-US" sz="1200" dirty="0" smtClean="0">
-                <a:effectLst/>
-                <a:latin typeface="Calibri" panose="020F0502020204030204" pitchFamily="34" charset="0"/>
-                <a:ea typeface="Calibri" panose="020F0502020204030204" pitchFamily="34" charset="0"/>
-                <a:cs typeface="Arial" panose="020B0604020202020204" pitchFamily="34" charset="0"/>
-              </a:rPr>
-              <a:t>": [0,0,0,1],</a:t>
-            </a:r>
-          </a:p>
-          <a:p>
-            <a:pPr>
-              <a:lnSpc>
-                <a:spcPct val="107000"/>
-              </a:lnSpc>
-              <a:spcAft>
-                <a:spcPts val="800"/>
-              </a:spcAft>
-            </a:pPr>
-            <a:r>
-              <a:rPr lang="en-US" sz="1200" dirty="0" smtClean="0">
-                <a:effectLst/>
-                <a:latin typeface="Calibri" panose="020F0502020204030204" pitchFamily="34" charset="0"/>
-                <a:ea typeface="Calibri" panose="020F0502020204030204" pitchFamily="34" charset="0"/>
-                <a:cs typeface="Arial" panose="020B0604020202020204" pitchFamily="34" charset="0"/>
-              </a:rPr>
-              <a:t>        "hex": "#FFF"</a:t>
-            </a:r>
-          </a:p>
-          <a:p>
-            <a:pPr>
-              <a:lnSpc>
-                <a:spcPct val="107000"/>
-              </a:lnSpc>
-              <a:spcAft>
-                <a:spcPts val="800"/>
-              </a:spcAft>
-            </a:pPr>
-            <a:r>
-              <a:rPr lang="en-US" sz="1200" dirty="0" smtClean="0">
-                <a:effectLst/>
-                <a:latin typeface="Calibri" panose="020F0502020204030204" pitchFamily="34" charset="0"/>
-                <a:ea typeface="Calibri" panose="020F0502020204030204" pitchFamily="34" charset="0"/>
-                <a:cs typeface="Arial" panose="020B0604020202020204" pitchFamily="34" charset="0"/>
-              </a:rPr>
-              <a:t>      }</a:t>
-            </a:r>
-          </a:p>
-          <a:p>
-            <a:pPr>
-              <a:lnSpc>
-                <a:spcPct val="107000"/>
-              </a:lnSpc>
-              <a:spcAft>
-                <a:spcPts val="800"/>
-              </a:spcAft>
-            </a:pPr>
-            <a:r>
-              <a:rPr lang="en-US" sz="1200" dirty="0" smtClean="0">
-                <a:effectLst/>
-                <a:latin typeface="Calibri" panose="020F0502020204030204" pitchFamily="34" charset="0"/>
-                <a:ea typeface="Calibri" panose="020F0502020204030204" pitchFamily="34" charset="0"/>
-                <a:cs typeface="Arial" panose="020B0604020202020204" pitchFamily="34" charset="0"/>
-              </a:rPr>
-              <a:t>    }</a:t>
-            </a:r>
-          </a:p>
-          <a:p>
-            <a:pPr>
-              <a:lnSpc>
-                <a:spcPct val="107000"/>
-              </a:lnSpc>
-              <a:spcAft>
-                <a:spcPts val="800"/>
-              </a:spcAft>
-            </a:pPr>
-            <a:r>
-              <a:rPr lang="en-US" sz="1200" dirty="0" smtClean="0">
-                <a:effectLst/>
-                <a:latin typeface="Calibri" panose="020F0502020204030204" pitchFamily="34" charset="0"/>
-                <a:ea typeface="Calibri" panose="020F0502020204030204" pitchFamily="34" charset="0"/>
-                <a:cs typeface="Arial" panose="020B0604020202020204" pitchFamily="34" charset="0"/>
-              </a:rPr>
-              <a:t>  ]</a:t>
-            </a:r>
-          </a:p>
-          <a:p>
-            <a:pPr>
-              <a:lnSpc>
-                <a:spcPct val="107000"/>
-              </a:lnSpc>
-              <a:spcAft>
-                <a:spcPts val="800"/>
-              </a:spcAft>
-            </a:pPr>
-            <a:r>
-              <a:rPr lang="en-US" sz="1200" dirty="0" smtClean="0">
-                <a:effectLst/>
-                <a:latin typeface="Calibri" panose="020F0502020204030204" pitchFamily="34" charset="0"/>
-                <a:ea typeface="Calibri" panose="020F0502020204030204" pitchFamily="34" charset="0"/>
-                <a:cs typeface="Arial" panose="020B0604020202020204" pitchFamily="34" charset="0"/>
-              </a:rPr>
-              <a:t>}</a:t>
-            </a:r>
-            <a:endParaRPr lang="en-US" sz="1200" dirty="0">
-              <a:effectLst/>
-              <a:latin typeface="Calibri" panose="020F0502020204030204" pitchFamily="34" charset="0"/>
-              <a:ea typeface="Calibri" panose="020F0502020204030204" pitchFamily="34" charset="0"/>
-              <a:cs typeface="Arial" panose="020B0604020202020204" pitchFamily="34" charset="0"/>
-            </a:endParaRPr>
-          </a:p>
-        </p:txBody>
-      </p:sp>
-    </p:spTree>
-    <p:extLst>
-      <p:ext uri="{BB962C8B-B14F-4D97-AF65-F5344CB8AC3E}">
-        <p14:creationId xmlns:p14="http://schemas.microsoft.com/office/powerpoint/2010/main" val="2441500091"/>
       </p:ext>
     </p:extLst>
   </p:cSld>
@@ -4902,6 +4697,12 @@
 </file>
 
 <file path=customXml/item2.xml><?xml version="1.0" encoding="utf-8"?>
+<p:properties xmlns:p="http://schemas.microsoft.com/office/2006/metadata/properties" xmlns:xsi="http://www.w3.org/2001/XMLSchema-instance" xmlns:pc="http://schemas.microsoft.com/office/infopath/2007/PartnerControls">
+  <documentManagement/>
+</p:properties>
+</file>
+
+<file path=customXml/item3.xml><?xml version="1.0" encoding="utf-8"?>
 <?mso-contentType ?>
 <FormTemplates xmlns="http://schemas.microsoft.com/sharepoint/v3/contenttype/forms">
   <Display>DocumentLibraryForm</Display>
@@ -4910,20 +4711,35 @@
 </FormTemplates>
 </file>
 
-<file path=customXml/item3.xml><?xml version="1.0" encoding="utf-8"?>
-<p:properties xmlns:p="http://schemas.microsoft.com/office/2006/metadata/properties" xmlns:xsi="http://www.w3.org/2001/XMLSchema-instance" xmlns:pc="http://schemas.microsoft.com/office/infopath/2007/PartnerControls">
-  <documentManagement/>
-</p:properties>
-</file>
-
 <file path=customXml/itemProps1.xml><?xml version="1.0" encoding="utf-8"?>
-<ds:datastoreItem xmlns:ds="http://schemas.openxmlformats.org/officeDocument/2006/customXml" ds:itemID="{31076EE6-2E87-4625-A730-181DC5A87868}"/>
+<ds:datastoreItem xmlns:ds="http://schemas.openxmlformats.org/officeDocument/2006/customXml" ds:itemID="{31076EE6-2E87-4625-A730-181DC5A87868}">
+  <ds:schemaRefs>
+    <ds:schemaRef ds:uri="http://schemas.microsoft.com/office/2006/metadata/contentType"/>
+    <ds:schemaRef ds:uri="http://schemas.microsoft.com/office/2006/metadata/properties/metaAttributes"/>
+    <ds:schemaRef ds:uri="http://www.w3.org/2001/XMLSchema"/>
+    <ds:schemaRef ds:uri="http://schemas.microsoft.com/office/2006/metadata/properties"/>
+    <ds:schemaRef ds:uri="http://schemas.openxmlformats.org/package/2006/metadata/core-properties"/>
+    <ds:schemaRef ds:uri="http://purl.org/dc/elements/1.1/"/>
+    <ds:schemaRef ds:uri="http://purl.org/dc/terms/"/>
+    <ds:schemaRef ds:uri="http://schemas.microsoft.com/internal/obd"/>
+    <ds:schemaRef ds:uri="http://schemas.microsoft.com/office/infopath/2007/PartnerControls"/>
+  </ds:schemaRefs>
+</ds:datastoreItem>
 </file>
 
 <file path=customXml/itemProps2.xml><?xml version="1.0" encoding="utf-8"?>
-<ds:datastoreItem xmlns:ds="http://schemas.openxmlformats.org/officeDocument/2006/customXml" ds:itemID="{07F1637A-0CB9-473E-9622-872165A59CC1}"/>
+<ds:datastoreItem xmlns:ds="http://schemas.openxmlformats.org/officeDocument/2006/customXml" ds:itemID="{F5D0861F-50A3-4321-B371-A43CA7EAA7D3}">
+  <ds:schemaRefs>
+    <ds:schemaRef ds:uri="http://schemas.microsoft.com/office/2006/metadata/properties"/>
+    <ds:schemaRef ds:uri="http://schemas.microsoft.com/office/infopath/2007/PartnerControls"/>
+  </ds:schemaRefs>
+</ds:datastoreItem>
 </file>
 
 <file path=customXml/itemProps3.xml><?xml version="1.0" encoding="utf-8"?>
-<ds:datastoreItem xmlns:ds="http://schemas.openxmlformats.org/officeDocument/2006/customXml" ds:itemID="{F5D0861F-50A3-4321-B371-A43CA7EAA7D3}"/>
+<ds:datastoreItem xmlns:ds="http://schemas.openxmlformats.org/officeDocument/2006/customXml" ds:itemID="{07F1637A-0CB9-473E-9622-872165A59CC1}">
+  <ds:schemaRefs>
+    <ds:schemaRef ds:uri="http://schemas.microsoft.com/sharepoint/v3/contenttype/forms"/>
+  </ds:schemaRefs>
+</ds:datastoreItem>
 </file>
</xml_diff>